<commit_message>
arquivos de apresentação em github
</commit_message>
<xml_diff>
--- a/web-data-viz-main/DOCUMENTOS_DE_APOIO/arquivos ppt/Apresentação.pptx
+++ b/web-data-viz-main/DOCUMENTOS_DE_APOIO/arquivos ppt/Apresentação.pptx
@@ -7,9 +7,11 @@
   <p:sldIdLst>
     <p:sldId id="256" r:id="rId2"/>
     <p:sldId id="258" r:id="rId3"/>
-    <p:sldId id="260" r:id="rId4"/>
-    <p:sldId id="261" r:id="rId5"/>
+    <p:sldId id="261" r:id="rId4"/>
+    <p:sldId id="264" r:id="rId5"/>
     <p:sldId id="262" r:id="rId6"/>
+    <p:sldId id="260" r:id="rId7"/>
+    <p:sldId id="263" r:id="rId8"/>
   </p:sldIdLst>
   <p:sldSz cx="12192000" cy="6858000"/>
   <p:notesSz cx="6858000" cy="9144000"/>
@@ -119,7 +121,9 @@
 <file path=ppt/revisionInfo.xml><?xml version="1.0" encoding="utf-8"?>
 <p1510:revInfo xmlns:a="http://schemas.openxmlformats.org/drawingml/2006/main" xmlns:r="http://schemas.openxmlformats.org/officeDocument/2006/relationships" xmlns:p1510="http://schemas.microsoft.com/office/powerpoint/2015/10/main">
   <p1510:revLst>
-    <p1510:client id="{35995511-B8E7-E20B-AA5F-038D747F8C1C}" v="379" dt="2025-06-03T17:12:32.841"/>
+    <p1510:client id="{34B4F09C-B263-782F-6D32-82705691699E}" v="419" dt="2025-06-06T04:22:30.256"/>
+    <p1510:client id="{4A0B8A93-DEE7-8D75-ECA9-D2134AAE2AC9}" v="14" dt="2025-06-06T14:46:28.127"/>
+    <p1510:client id="{C796631D-3C38-6489-17E9-E7A77384B527}" v="97" dt="2025-06-05T17:06:20.548"/>
   </p1510:revLst>
 </p1510:revInfo>
 </file>
@@ -336,7 +340,7 @@
             <a:fld id="{B61BEF0D-F0BB-DE4B-95CE-6DB70DBA9567}" type="datetimeFigureOut">
               <a:rPr lang="en-US" dirty="0"/>
               <a:pPr/>
-              <a:t>6/3/2025</a:t>
+              <a:t>6/6/2025</a:t>
             </a:fld>
             <a:endParaRPr lang="en-US" dirty="0"/>
           </a:p>
@@ -624,7 +628,7 @@
             <a:fld id="{B61BEF0D-F0BB-DE4B-95CE-6DB70DBA9567}" type="datetimeFigureOut">
               <a:rPr lang="en-US" dirty="0"/>
               <a:pPr/>
-              <a:t>6/3/2025</a:t>
+              <a:t>6/6/2025</a:t>
             </a:fld>
             <a:endParaRPr lang="en-US" dirty="0"/>
           </a:p>
@@ -884,7 +888,7 @@
             <a:fld id="{B61BEF0D-F0BB-DE4B-95CE-6DB70DBA9567}" type="datetimeFigureOut">
               <a:rPr lang="en-US" dirty="0"/>
               <a:pPr/>
-              <a:t>6/3/2025</a:t>
+              <a:t>6/6/2025</a:t>
             </a:fld>
             <a:endParaRPr lang="en-US" dirty="0"/>
           </a:p>
@@ -1354,7 +1358,7 @@
             <a:fld id="{B61BEF0D-F0BB-DE4B-95CE-6DB70DBA9567}" type="datetimeFigureOut">
               <a:rPr lang="en-US" dirty="0"/>
               <a:pPr/>
-              <a:t>6/3/2025</a:t>
+              <a:t>6/6/2025</a:t>
             </a:fld>
             <a:endParaRPr lang="en-US" dirty="0"/>
           </a:p>
@@ -1535,7 +1539,7 @@
             <a:fld id="{B61BEF0D-F0BB-DE4B-95CE-6DB70DBA9567}" type="datetimeFigureOut">
               <a:rPr lang="en-US" dirty="0"/>
               <a:pPr/>
-              <a:t>6/3/2025</a:t>
+              <a:t>6/6/2025</a:t>
             </a:fld>
             <a:endParaRPr lang="en-US" dirty="0"/>
           </a:p>
@@ -2112,7 +2116,7 @@
             <a:fld id="{B61BEF0D-F0BB-DE4B-95CE-6DB70DBA9567}" type="datetimeFigureOut">
               <a:rPr lang="en-US" dirty="0"/>
               <a:pPr/>
-              <a:t>6/3/2025</a:t>
+              <a:t>6/6/2025</a:t>
             </a:fld>
             <a:endParaRPr lang="en-US" dirty="0"/>
           </a:p>
@@ -2445,7 +2449,7 @@
             <a:fld id="{B61BEF0D-F0BB-DE4B-95CE-6DB70DBA9567}" type="datetimeFigureOut">
               <a:rPr lang="en-US" dirty="0"/>
               <a:pPr/>
-              <a:t>6/3/2025</a:t>
+              <a:t>6/6/2025</a:t>
             </a:fld>
             <a:endParaRPr lang="en-US" dirty="0"/>
           </a:p>
@@ -2620,7 +2624,7 @@
             <a:fld id="{B61BEF0D-F0BB-DE4B-95CE-6DB70DBA9567}" type="datetimeFigureOut">
               <a:rPr lang="en-US" dirty="0"/>
               <a:pPr/>
-              <a:t>6/3/2025</a:t>
+              <a:t>6/6/2025</a:t>
             </a:fld>
             <a:endParaRPr lang="en-US" dirty="0"/>
           </a:p>
@@ -2800,7 +2804,7 @@
             <a:fld id="{B61BEF0D-F0BB-DE4B-95CE-6DB70DBA9567}" type="datetimeFigureOut">
               <a:rPr lang="en-US" dirty="0"/>
               <a:pPr/>
-              <a:t>6/3/2025</a:t>
+              <a:t>6/6/2025</a:t>
             </a:fld>
             <a:endParaRPr lang="en-US" dirty="0"/>
           </a:p>
@@ -2970,7 +2974,7 @@
             <a:fld id="{B61BEF0D-F0BB-DE4B-95CE-6DB70DBA9567}" type="datetimeFigureOut">
               <a:rPr lang="en-US" dirty="0"/>
               <a:pPr/>
-              <a:t>6/3/2025</a:t>
+              <a:t>6/6/2025</a:t>
             </a:fld>
             <a:endParaRPr lang="en-US" dirty="0"/>
           </a:p>
@@ -3228,7 +3232,7 @@
             <a:fld id="{B61BEF0D-F0BB-DE4B-95CE-6DB70DBA9567}" type="datetimeFigureOut">
               <a:rPr lang="en-US" dirty="0"/>
               <a:pPr/>
-              <a:t>6/3/2025</a:t>
+              <a:t>6/6/2025</a:t>
             </a:fld>
             <a:endParaRPr lang="en-US" dirty="0"/>
           </a:p>
@@ -3519,7 +3523,7 @@
             <a:fld id="{B61BEF0D-F0BB-DE4B-95CE-6DB70DBA9567}" type="datetimeFigureOut">
               <a:rPr lang="en-US" dirty="0"/>
               <a:pPr/>
-              <a:t>6/3/2025</a:t>
+              <a:t>6/6/2025</a:t>
             </a:fld>
             <a:endParaRPr lang="en-US" dirty="0"/>
           </a:p>
@@ -3948,7 +3952,7 @@
             <a:fld id="{B61BEF0D-F0BB-DE4B-95CE-6DB70DBA9567}" type="datetimeFigureOut">
               <a:rPr lang="en-US" dirty="0"/>
               <a:pPr/>
-              <a:t>6/3/2025</a:t>
+              <a:t>6/6/2025</a:t>
             </a:fld>
             <a:endParaRPr lang="en-US" dirty="0"/>
           </a:p>
@@ -4067,7 +4071,7 @@
             <a:fld id="{B61BEF0D-F0BB-DE4B-95CE-6DB70DBA9567}" type="datetimeFigureOut">
               <a:rPr lang="en-US" dirty="0"/>
               <a:pPr/>
-              <a:t>6/3/2025</a:t>
+              <a:t>6/6/2025</a:t>
             </a:fld>
             <a:endParaRPr lang="en-US" dirty="0"/>
           </a:p>
@@ -4164,7 +4168,7 @@
             <a:fld id="{B61BEF0D-F0BB-DE4B-95CE-6DB70DBA9567}" type="datetimeFigureOut">
               <a:rPr lang="en-US" dirty="0"/>
               <a:pPr/>
-              <a:t>6/3/2025</a:t>
+              <a:t>6/6/2025</a:t>
             </a:fld>
             <a:endParaRPr lang="en-US" dirty="0"/>
           </a:p>
@@ -4447,7 +4451,7 @@
             <a:fld id="{B61BEF0D-F0BB-DE4B-95CE-6DB70DBA9567}" type="datetimeFigureOut">
               <a:rPr lang="en-US" dirty="0"/>
               <a:pPr/>
-              <a:t>6/3/2025</a:t>
+              <a:t>6/6/2025</a:t>
             </a:fld>
             <a:endParaRPr lang="en-US" dirty="0"/>
           </a:p>
@@ -4735,7 +4739,7 @@
             <a:fld id="{B61BEF0D-F0BB-DE4B-95CE-6DB70DBA9567}" type="datetimeFigureOut">
               <a:rPr lang="en-US" dirty="0"/>
               <a:pPr/>
-              <a:t>6/3/2025</a:t>
+              <a:t>6/6/2025</a:t>
             </a:fld>
             <a:endParaRPr lang="en-US" dirty="0"/>
           </a:p>
@@ -5012,7 +5016,7 @@
             <a:fld id="{B61BEF0D-F0BB-DE4B-95CE-6DB70DBA9567}" type="datetimeFigureOut">
               <a:rPr lang="en-US" dirty="0"/>
               <a:pPr/>
-              <a:t>6/3/2025</a:t>
+              <a:t>6/6/2025</a:t>
             </a:fld>
             <a:endParaRPr lang="en-US" dirty="0"/>
           </a:p>
@@ -6331,9 +6335,23 @@
           <a:lstStyle/>
           <a:p>
             <a:r>
-              <a:rPr lang="pt-BR"/>
-              <a:t>Destrinchando:</a:t>
-            </a:r>
+              <a:rPr lang="pt-BR" dirty="0">
+                <a:gradFill flip="none">
+                  <a:gsLst>
+                    <a:gs pos="0">
+                      <a:srgbClr val="FFFFFF"/>
+                    </a:gs>
+                    <a:gs pos="100000">
+                      <a:srgbClr val="FFFFFF"/>
+                    </a:gs>
+                  </a:gsLst>
+                  <a:lin ang="5580000" scaled="0"/>
+                  <a:tileRect/>
+                </a:gradFill>
+              </a:rPr>
+              <a:t>Sobre mim:</a:t>
+            </a:r>
+            <a:endParaRPr lang="pt-BR" dirty="0"/>
           </a:p>
         </p:txBody>
       </p:sp>
@@ -6355,8 +6373,8 @@
         </p:nvSpPr>
         <p:spPr>
           <a:xfrm>
-            <a:off x="6420465" y="2666999"/>
-            <a:ext cx="5122606" cy="3216276"/>
+            <a:off x="6420465" y="2063150"/>
+            <a:ext cx="5122606" cy="4193936"/>
           </a:xfrm>
         </p:spPr>
         <p:txBody>
@@ -6365,22 +6383,274 @@
           </a:bodyPr>
           <a:lstStyle/>
           <a:p>
-            <a:r>
-              <a:rPr lang="pt-BR"/>
-              <a:t>Jogos de Computador/Videogame</a:t>
-            </a:r>
-          </a:p>
-          <a:p>
-            <a:r>
-              <a:rPr lang="pt-BR"/>
-              <a:t>Jogos de Tabuleiro</a:t>
-            </a:r>
-          </a:p>
-          <a:p>
-            <a:r>
-              <a:rPr lang="pt-BR"/>
-              <a:t>Jogos Educativos</a:t>
-            </a:r>
+            <a:pPr>
+              <a:buClr>
+                <a:srgbClr val="FFFFFF"/>
+              </a:buClr>
+            </a:pPr>
+            <a:r>
+              <a:rPr lang="pt-BR" dirty="0">
+                <a:gradFill flip="none">
+                  <a:gsLst>
+                    <a:gs pos="0">
+                      <a:srgbClr val="FFFFFF"/>
+                    </a:gs>
+                    <a:gs pos="100000">
+                      <a:srgbClr val="FFFFFF"/>
+                    </a:gs>
+                  </a:gsLst>
+                  <a:lin ang="5580000" scaled="0"/>
+                  <a:tileRect/>
+                </a:gradFill>
+              </a:rPr>
+              <a:t>Porque escolhi esse tema?</a:t>
+            </a:r>
+            <a:endParaRPr lang="pt-BR" dirty="0">
+              <a:gradFill flip="none">
+                <a:gsLst>
+                  <a:gs pos="0">
+                    <a:srgbClr val="FFFFFF"/>
+                  </a:gs>
+                  <a:gs pos="100000">
+                    <a:srgbClr val="FFFFFF"/>
+                  </a:gs>
+                </a:gsLst>
+                <a:lin ang="5580000" scaled="0"/>
+                <a:tileRect/>
+              </a:gradFill>
+              <a:effectLst>
+                <a:glow rad="38100">
+                  <a:prstClr val="black">
+                    <a:lumMod val="50000"/>
+                    <a:lumOff val="50000"/>
+                    <a:alpha val="20000"/>
+                  </a:prstClr>
+                </a:glow>
+                <a:outerShdw blurRad="44450" dist="12700" dir="13860000" algn="tl" rotWithShape="0">
+                  <a:srgbClr val="000000">
+                    <a:alpha val="20000"/>
+                  </a:srgbClr>
+                </a:outerShdw>
+              </a:effectLst>
+            </a:endParaRPr>
+          </a:p>
+          <a:p>
+            <a:pPr marL="0" indent="0">
+              <a:buClr>
+                <a:srgbClr val="FFFFFF"/>
+              </a:buClr>
+              <a:buNone/>
+            </a:pPr>
+            <a:r>
+              <a:rPr lang="pt-BR" dirty="0">
+                <a:gradFill flip="none">
+                  <a:gsLst>
+                    <a:gs pos="0">
+                      <a:srgbClr val="FFFFFF"/>
+                    </a:gs>
+                    <a:gs pos="100000">
+                      <a:srgbClr val="FFFFFF"/>
+                    </a:gs>
+                  </a:gsLst>
+                  <a:lin ang="5580000" scaled="0"/>
+                  <a:tileRect/>
+                </a:gradFill>
+                <a:effectLst>
+                  <a:glow rad="38100">
+                    <a:prstClr val="black">
+                      <a:lumMod val="50000"/>
+                      <a:lumOff val="50000"/>
+                      <a:alpha val="20000"/>
+                    </a:prstClr>
+                  </a:glow>
+                  <a:outerShdw blurRad="44450" dist="12700" dir="13860000" algn="tl" rotWithShape="0">
+                    <a:srgbClr val="000000">
+                      <a:alpha val="20000"/>
+                    </a:srgbClr>
+                  </a:outerShdw>
+                </a:effectLst>
+              </a:rPr>
+              <a:t> - Vínculos afetivos</a:t>
+            </a:r>
+          </a:p>
+          <a:p>
+            <a:pPr marL="0" indent="0">
+              <a:buNone/>
+            </a:pPr>
+            <a:r>
+              <a:rPr lang="pt-BR" dirty="0">
+                <a:gradFill flip="none">
+                  <a:gsLst>
+                    <a:gs pos="0">
+                      <a:srgbClr val="FFFFFF"/>
+                    </a:gs>
+                    <a:gs pos="100000">
+                      <a:srgbClr val="FFFFFF"/>
+                    </a:gs>
+                  </a:gsLst>
+                  <a:lin ang="5580000" scaled="0"/>
+                  <a:tileRect/>
+                </a:gradFill>
+                <a:effectLst>
+                  <a:glow rad="38100">
+                    <a:prstClr val="black">
+                      <a:lumMod val="50000"/>
+                      <a:lumOff val="50000"/>
+                      <a:alpha val="20000"/>
+                    </a:prstClr>
+                  </a:glow>
+                  <a:outerShdw blurRad="44450" dist="12700" dir="13860000" algn="tl" rotWithShape="0">
+                    <a:srgbClr val="000000">
+                      <a:alpha val="20000"/>
+                    </a:srgbClr>
+                  </a:outerShdw>
+                </a:effectLst>
+              </a:rPr>
+              <a:t>  - Começou com um Super Nintendo</a:t>
+            </a:r>
+          </a:p>
+          <a:p>
+            <a:pPr marL="0" indent="0">
+              <a:buNone/>
+            </a:pPr>
+            <a:r>
+              <a:rPr lang="pt-BR" dirty="0">
+                <a:gradFill flip="none">
+                  <a:gsLst>
+                    <a:gs pos="0">
+                      <a:srgbClr val="FFFFFF"/>
+                    </a:gs>
+                    <a:gs pos="100000">
+                      <a:srgbClr val="FFFFFF"/>
+                    </a:gs>
+                  </a:gsLst>
+                  <a:lin ang="5580000" scaled="0"/>
+                  <a:tileRect/>
+                </a:gradFill>
+                <a:effectLst>
+                  <a:glow rad="38100">
+                    <a:prstClr val="black">
+                      <a:lumMod val="50000"/>
+                      <a:lumOff val="50000"/>
+                      <a:alpha val="20000"/>
+                    </a:prstClr>
+                  </a:glow>
+                  <a:outerShdw blurRad="44450" dist="12700" dir="13860000" algn="tl" rotWithShape="0">
+                    <a:srgbClr val="000000">
+                      <a:alpha val="20000"/>
+                    </a:srgbClr>
+                  </a:outerShdw>
+                </a:effectLst>
+              </a:rPr>
+              <a:t>  - Comunidades</a:t>
+            </a:r>
+          </a:p>
+          <a:p>
+            <a:pPr marL="0" indent="0">
+              <a:buNone/>
+            </a:pPr>
+            <a:r>
+              <a:rPr lang="pt-BR" dirty="0">
+                <a:gradFill flip="none">
+                  <a:gsLst>
+                    <a:gs pos="0">
+                      <a:srgbClr val="FFFFFF"/>
+                    </a:gs>
+                    <a:gs pos="100000">
+                      <a:srgbClr val="FFFFFF"/>
+                    </a:gs>
+                  </a:gsLst>
+                  <a:lin ang="5580000" scaled="0"/>
+                  <a:tileRect/>
+                </a:gradFill>
+                <a:effectLst>
+                  <a:glow rad="38100">
+                    <a:prstClr val="black">
+                      <a:lumMod val="50000"/>
+                      <a:lumOff val="50000"/>
+                      <a:alpha val="20000"/>
+                    </a:prstClr>
+                  </a:glow>
+                  <a:outerShdw blurRad="44450" dist="12700" dir="13860000" algn="tl" rotWithShape="0">
+                    <a:srgbClr val="000000">
+                      <a:alpha val="20000"/>
+                    </a:srgbClr>
+                  </a:outerShdw>
+                </a:effectLst>
+              </a:rPr>
+              <a:t> - Liberdade de expressão</a:t>
+            </a:r>
+          </a:p>
+          <a:p>
+            <a:pPr marL="0" indent="0">
+              <a:buNone/>
+            </a:pPr>
+            <a:r>
+              <a:rPr lang="pt-BR" dirty="0">
+                <a:gradFill flip="none">
+                  <a:gsLst>
+                    <a:gs pos="0">
+                      <a:srgbClr val="FFFFFF"/>
+                    </a:gs>
+                    <a:gs pos="100000">
+                      <a:srgbClr val="FFFFFF"/>
+                    </a:gs>
+                  </a:gsLst>
+                  <a:lin ang="5580000" scaled="0"/>
+                  <a:tileRect/>
+                </a:gradFill>
+                <a:effectLst>
+                  <a:glow rad="38100">
+                    <a:prstClr val="black">
+                      <a:lumMod val="50000"/>
+                      <a:lumOff val="50000"/>
+                      <a:alpha val="20000"/>
+                    </a:prstClr>
+                  </a:glow>
+                  <a:outerShdw blurRad="44450" dist="12700" dir="13860000" algn="tl" rotWithShape="0">
+                    <a:srgbClr val="000000">
+                      <a:alpha val="20000"/>
+                    </a:srgbClr>
+                  </a:outerShdw>
+                </a:effectLst>
+              </a:rPr>
+              <a:t> - Raciocínio Lógico</a:t>
+            </a:r>
+          </a:p>
+          <a:p>
+            <a:pPr>
+              <a:buClr>
+                <a:srgbClr val="FFFFFF"/>
+              </a:buClr>
+            </a:pPr>
+            <a:endParaRPr lang="pt-BR" dirty="0">
+              <a:gradFill flip="none">
+                <a:gsLst>
+                  <a:gs pos="0">
+                    <a:srgbClr val="FFFFFF"/>
+                  </a:gs>
+                  <a:gs pos="100000">
+                    <a:srgbClr val="FFFFFF"/>
+                  </a:gs>
+                </a:gsLst>
+                <a:lin ang="5580000" scaled="0"/>
+                <a:tileRect/>
+              </a:gradFill>
+              <a:effectLst>
+                <a:glow rad="38100">
+                  <a:prstClr val="black">
+                    <a:lumMod val="50000"/>
+                    <a:lumOff val="50000"/>
+                    <a:alpha val="20000"/>
+                  </a:prstClr>
+                </a:glow>
+                <a:outerShdw blurRad="44450" dist="12700" dir="13860000" algn="tl" rotWithShape="0">
+                  <a:srgbClr val="000000">
+                    <a:alpha val="20000"/>
+                  </a:srgbClr>
+                </a:outerShdw>
+              </a:effectLst>
+            </a:endParaRPr>
           </a:p>
         </p:txBody>
       </p:sp>
@@ -6458,6 +6728,345 @@
   <p:clrMapOvr>
     <a:masterClrMapping/>
   </p:clrMapOvr>
+  <mc:AlternateContent xmlns:mc="http://schemas.openxmlformats.org/markup-compatibility/2006">
+    <mc:Choice xmlns:p14="http://schemas.microsoft.com/office/powerpoint/2010/main" Requires="p14">
+      <p:transition spd="med" p14:dur="700">
+        <p:fade/>
+      </p:transition>
+    </mc:Choice>
+    <mc:Fallback>
+      <p:transition spd="med">
+        <p:fade/>
+      </p:transition>
+    </mc:Fallback>
+  </mc:AlternateContent>
+  <p:timing>
+    <p:tnLst>
+      <p:par>
+        <p:cTn id="1" dur="indefinite" restart="never" nodeType="tmRoot">
+          <p:childTnLst>
+            <p:seq concurrent="1" nextAc="seek">
+              <p:cTn id="2" dur="indefinite" nodeType="mainSeq">
+                <p:childTnLst>
+                  <p:par>
+                    <p:cTn id="3" fill="hold">
+                      <p:stCondLst>
+                        <p:cond delay="indefinite"/>
+                      </p:stCondLst>
+                      <p:childTnLst>
+                        <p:par>
+                          <p:cTn id="4" fill="hold">
+                            <p:stCondLst>
+                              <p:cond delay="0"/>
+                            </p:stCondLst>
+                            <p:childTnLst>
+                              <p:par>
+                                <p:cTn id="5" presetID="1" presetClass="entr" presetSubtype="0" fill="hold" grpId="0" nodeType="clickEffect">
+                                  <p:stCondLst>
+                                    <p:cond delay="0"/>
+                                  </p:stCondLst>
+                                  <p:childTnLst>
+                                    <p:set>
+                                      <p:cBhvr>
+                                        <p:cTn id="6" dur="1" fill="hold">
+                                          <p:stCondLst>
+                                            <p:cond delay="0"/>
+                                          </p:stCondLst>
+                                        </p:cTn>
+                                        <p:tgtEl>
+                                          <p:spTgt spid="3">
+                                            <p:txEl>
+                                              <p:pRg st="0" end="0"/>
+                                            </p:txEl>
+                                          </p:spTgt>
+                                        </p:tgtEl>
+                                        <p:attrNameLst>
+                                          <p:attrName>style.visibility</p:attrName>
+                                        </p:attrNameLst>
+                                      </p:cBhvr>
+                                      <p:to>
+                                        <p:strVal val="visible"/>
+                                      </p:to>
+                                    </p:set>
+                                  </p:childTnLst>
+                                </p:cTn>
+                              </p:par>
+                            </p:childTnLst>
+                          </p:cTn>
+                        </p:par>
+                      </p:childTnLst>
+                    </p:cTn>
+                  </p:par>
+                  <p:par>
+                    <p:cTn id="7" fill="hold">
+                      <p:stCondLst>
+                        <p:cond delay="indefinite"/>
+                      </p:stCondLst>
+                      <p:childTnLst>
+                        <p:par>
+                          <p:cTn id="8" fill="hold">
+                            <p:stCondLst>
+                              <p:cond delay="0"/>
+                            </p:stCondLst>
+                            <p:childTnLst>
+                              <p:par>
+                                <p:cTn id="9" presetID="1" presetClass="entr" presetSubtype="0" fill="hold" grpId="0" nodeType="clickEffect">
+                                  <p:stCondLst>
+                                    <p:cond delay="0"/>
+                                  </p:stCondLst>
+                                  <p:childTnLst>
+                                    <p:set>
+                                      <p:cBhvr>
+                                        <p:cTn id="10" dur="1" fill="hold">
+                                          <p:stCondLst>
+                                            <p:cond delay="0"/>
+                                          </p:stCondLst>
+                                        </p:cTn>
+                                        <p:tgtEl>
+                                          <p:spTgt spid="3">
+                                            <p:txEl>
+                                              <p:pRg st="1" end="1"/>
+                                            </p:txEl>
+                                          </p:spTgt>
+                                        </p:tgtEl>
+                                        <p:attrNameLst>
+                                          <p:attrName>style.visibility</p:attrName>
+                                        </p:attrNameLst>
+                                      </p:cBhvr>
+                                      <p:to>
+                                        <p:strVal val="visible"/>
+                                      </p:to>
+                                    </p:set>
+                                  </p:childTnLst>
+                                </p:cTn>
+                              </p:par>
+                            </p:childTnLst>
+                          </p:cTn>
+                        </p:par>
+                      </p:childTnLst>
+                    </p:cTn>
+                  </p:par>
+                  <p:par>
+                    <p:cTn id="11" fill="hold">
+                      <p:stCondLst>
+                        <p:cond delay="indefinite"/>
+                      </p:stCondLst>
+                      <p:childTnLst>
+                        <p:par>
+                          <p:cTn id="12" fill="hold">
+                            <p:stCondLst>
+                              <p:cond delay="0"/>
+                            </p:stCondLst>
+                            <p:childTnLst>
+                              <p:par>
+                                <p:cTn id="13" presetID="1" presetClass="entr" presetSubtype="0" fill="hold" grpId="0" nodeType="clickEffect">
+                                  <p:stCondLst>
+                                    <p:cond delay="0"/>
+                                  </p:stCondLst>
+                                  <p:childTnLst>
+                                    <p:set>
+                                      <p:cBhvr>
+                                        <p:cTn id="14" dur="1" fill="hold">
+                                          <p:stCondLst>
+                                            <p:cond delay="0"/>
+                                          </p:stCondLst>
+                                        </p:cTn>
+                                        <p:tgtEl>
+                                          <p:spTgt spid="3">
+                                            <p:txEl>
+                                              <p:pRg st="2" end="2"/>
+                                            </p:txEl>
+                                          </p:spTgt>
+                                        </p:tgtEl>
+                                        <p:attrNameLst>
+                                          <p:attrName>style.visibility</p:attrName>
+                                        </p:attrNameLst>
+                                      </p:cBhvr>
+                                      <p:to>
+                                        <p:strVal val="visible"/>
+                                      </p:to>
+                                    </p:set>
+                                  </p:childTnLst>
+                                </p:cTn>
+                              </p:par>
+                            </p:childTnLst>
+                          </p:cTn>
+                        </p:par>
+                      </p:childTnLst>
+                    </p:cTn>
+                  </p:par>
+                  <p:par>
+                    <p:cTn id="15" fill="hold">
+                      <p:stCondLst>
+                        <p:cond delay="indefinite"/>
+                      </p:stCondLst>
+                      <p:childTnLst>
+                        <p:par>
+                          <p:cTn id="16" fill="hold">
+                            <p:stCondLst>
+                              <p:cond delay="0"/>
+                            </p:stCondLst>
+                            <p:childTnLst>
+                              <p:par>
+                                <p:cTn id="17" presetID="1" presetClass="entr" presetSubtype="0" fill="hold" grpId="0" nodeType="clickEffect">
+                                  <p:stCondLst>
+                                    <p:cond delay="0"/>
+                                  </p:stCondLst>
+                                  <p:childTnLst>
+                                    <p:set>
+                                      <p:cBhvr>
+                                        <p:cTn id="18" dur="1" fill="hold">
+                                          <p:stCondLst>
+                                            <p:cond delay="0"/>
+                                          </p:stCondLst>
+                                        </p:cTn>
+                                        <p:tgtEl>
+                                          <p:spTgt spid="3">
+                                            <p:txEl>
+                                              <p:pRg st="3" end="3"/>
+                                            </p:txEl>
+                                          </p:spTgt>
+                                        </p:tgtEl>
+                                        <p:attrNameLst>
+                                          <p:attrName>style.visibility</p:attrName>
+                                        </p:attrNameLst>
+                                      </p:cBhvr>
+                                      <p:to>
+                                        <p:strVal val="visible"/>
+                                      </p:to>
+                                    </p:set>
+                                  </p:childTnLst>
+                                </p:cTn>
+                              </p:par>
+                            </p:childTnLst>
+                          </p:cTn>
+                        </p:par>
+                      </p:childTnLst>
+                    </p:cTn>
+                  </p:par>
+                  <p:par>
+                    <p:cTn id="19" fill="hold">
+                      <p:stCondLst>
+                        <p:cond delay="indefinite"/>
+                      </p:stCondLst>
+                      <p:childTnLst>
+                        <p:par>
+                          <p:cTn id="20" fill="hold">
+                            <p:stCondLst>
+                              <p:cond delay="0"/>
+                            </p:stCondLst>
+                            <p:childTnLst>
+                              <p:par>
+                                <p:cTn id="21" presetID="1" presetClass="entr" presetSubtype="0" fill="hold" grpId="0" nodeType="clickEffect">
+                                  <p:stCondLst>
+                                    <p:cond delay="0"/>
+                                  </p:stCondLst>
+                                  <p:childTnLst>
+                                    <p:set>
+                                      <p:cBhvr>
+                                        <p:cTn id="22" dur="1" fill="hold">
+                                          <p:stCondLst>
+                                            <p:cond delay="0"/>
+                                          </p:stCondLst>
+                                        </p:cTn>
+                                        <p:tgtEl>
+                                          <p:spTgt spid="3">
+                                            <p:txEl>
+                                              <p:pRg st="4" end="4"/>
+                                            </p:txEl>
+                                          </p:spTgt>
+                                        </p:tgtEl>
+                                        <p:attrNameLst>
+                                          <p:attrName>style.visibility</p:attrName>
+                                        </p:attrNameLst>
+                                      </p:cBhvr>
+                                      <p:to>
+                                        <p:strVal val="visible"/>
+                                      </p:to>
+                                    </p:set>
+                                  </p:childTnLst>
+                                </p:cTn>
+                              </p:par>
+                            </p:childTnLst>
+                          </p:cTn>
+                        </p:par>
+                      </p:childTnLst>
+                    </p:cTn>
+                  </p:par>
+                  <p:par>
+                    <p:cTn id="23" fill="hold">
+                      <p:stCondLst>
+                        <p:cond delay="indefinite"/>
+                      </p:stCondLst>
+                      <p:childTnLst>
+                        <p:par>
+                          <p:cTn id="24" fill="hold">
+                            <p:stCondLst>
+                              <p:cond delay="0"/>
+                            </p:stCondLst>
+                            <p:childTnLst>
+                              <p:par>
+                                <p:cTn id="25" presetID="1" presetClass="entr" presetSubtype="0" fill="hold" grpId="0" nodeType="clickEffect">
+                                  <p:stCondLst>
+                                    <p:cond delay="0"/>
+                                  </p:stCondLst>
+                                  <p:childTnLst>
+                                    <p:set>
+                                      <p:cBhvr>
+                                        <p:cTn id="26" dur="1" fill="hold">
+                                          <p:stCondLst>
+                                            <p:cond delay="0"/>
+                                          </p:stCondLst>
+                                        </p:cTn>
+                                        <p:tgtEl>
+                                          <p:spTgt spid="3">
+                                            <p:txEl>
+                                              <p:pRg st="5" end="5"/>
+                                            </p:txEl>
+                                          </p:spTgt>
+                                        </p:tgtEl>
+                                        <p:attrNameLst>
+                                          <p:attrName>style.visibility</p:attrName>
+                                        </p:attrNameLst>
+                                      </p:cBhvr>
+                                      <p:to>
+                                        <p:strVal val="visible"/>
+                                      </p:to>
+                                    </p:set>
+                                  </p:childTnLst>
+                                </p:cTn>
+                              </p:par>
+                            </p:childTnLst>
+                          </p:cTn>
+                        </p:par>
+                      </p:childTnLst>
+                    </p:cTn>
+                  </p:par>
+                </p:childTnLst>
+              </p:cTn>
+              <p:prevCondLst>
+                <p:cond evt="onPrev" delay="0">
+                  <p:tgtEl>
+                    <p:sldTgt/>
+                  </p:tgtEl>
+                </p:cond>
+              </p:prevCondLst>
+              <p:nextCondLst>
+                <p:cond evt="onNext" delay="0">
+                  <p:tgtEl>
+                    <p:sldTgt/>
+                  </p:tgtEl>
+                </p:cond>
+              </p:nextCondLst>
+            </p:seq>
+          </p:childTnLst>
+        </p:cTn>
+      </p:par>
+    </p:tnLst>
+    <p:bldLst>
+      <p:bldP spid="3" grpId="0" build="p"/>
+    </p:bldLst>
+  </p:timing>
 </p:sld>
 </file>
 
@@ -6478,12 +7087,44 @@
           <a:chExt cx="0" cy="0"/>
         </a:xfrm>
       </p:grpSpPr>
+      <p:pic>
+        <p:nvPicPr>
+          <p:cNvPr id="10" name="Imagem 9" descr="Grupo de pessoas fantasiadas&#10;&#10;O conteúdo gerado por IA pode estar incorreto.">
+            <a:extLst>
+              <a:ext uri="{FF2B5EF4-FFF2-40B4-BE49-F238E27FC236}">
+                <a16:creationId xmlns:a16="http://schemas.microsoft.com/office/drawing/2014/main" id="{F2B83C7E-7F88-7624-6953-3AB7D6DADEEA}"/>
+              </a:ext>
+            </a:extLst>
+          </p:cNvPr>
+          <p:cNvPicPr>
+            <a:picLocks noChangeAspect="1"/>
+          </p:cNvPicPr>
+          <p:nvPr/>
+        </p:nvPicPr>
+        <p:blipFill>
+          <a:blip r:embed="rId2">
+            <a:alphaModFix amt="22000"/>
+          </a:blip>
+          <a:stretch>
+            <a:fillRect/>
+          </a:stretch>
+        </p:blipFill>
+        <p:spPr>
+          <a:xfrm>
+            <a:off x="0" y="0"/>
+            <a:ext cx="12192000" cy="6858000"/>
+          </a:xfrm>
+          <a:prstGeom prst="rect">
+            <a:avLst/>
+          </a:prstGeom>
+        </p:spPr>
+      </p:pic>
       <p:sp>
         <p:nvSpPr>
           <p:cNvPr id="2" name="Title 1">
             <a:extLst>
               <a:ext uri="{FF2B5EF4-FFF2-40B4-BE49-F238E27FC236}">
-                <a16:creationId xmlns:a16="http://schemas.microsoft.com/office/drawing/2014/main" id="{6F03E8D2-045A-AE30-A9E2-A9C17769F076}"/>
+                <a16:creationId xmlns:a16="http://schemas.microsoft.com/office/drawing/2014/main" id="{2EC9BAE3-3967-A05A-59B0-08F0D4D9400A}"/>
               </a:ext>
             </a:extLst>
           </p:cNvPr>
@@ -6494,26 +7135,35 @@
             <p:ph type="title"/>
           </p:nvPr>
         </p:nvSpPr>
-        <p:spPr/>
-        <p:txBody>
-          <a:bodyPr/>
+        <p:spPr>
+          <a:xfrm>
+            <a:off x="1371598" y="319314"/>
+            <a:ext cx="9477377" cy="1030515"/>
+          </a:xfrm>
+        </p:spPr>
+        <p:txBody>
+          <a:bodyPr anchor="ctr">
+            <a:normAutofit/>
+          </a:bodyPr>
           <a:lstStyle/>
           <a:p>
-            <a:pPr algn="ctr"/>
-            <a:r>
-              <a:rPr lang="pt-BR" dirty="0"/>
-              <a:t>Porque jogos?</a:t>
-            </a:r>
-            <a:endParaRPr lang="pt-BR"/>
-          </a:p>
-        </p:txBody>
-      </p:sp>
-      <p:sp>
-        <p:nvSpPr>
-          <p:cNvPr id="3" name="Content Placeholder 2">
+            <a:r>
+              <a:rPr lang="pt-BR" sz="4000">
+                <a:solidFill>
+                  <a:srgbClr val="FFFFFF"/>
+                </a:solidFill>
+              </a:rPr>
+              <a:t>ODS</a:t>
+            </a:r>
+          </a:p>
+        </p:txBody>
+      </p:sp>
+      <p:sp>
+        <p:nvSpPr>
+          <p:cNvPr id="9" name="Content Placeholder 8">
             <a:extLst>
               <a:ext uri="{FF2B5EF4-FFF2-40B4-BE49-F238E27FC236}">
-                <a16:creationId xmlns:a16="http://schemas.microsoft.com/office/drawing/2014/main" id="{6A0DCDC5-9C77-EEAA-F8B0-2603CCD864E7}"/>
+                <a16:creationId xmlns:a16="http://schemas.microsoft.com/office/drawing/2014/main" id="{E363E1E1-62A0-8414-4A5A-979CC4DBF868}"/>
               </a:ext>
             </a:extLst>
           </p:cNvPr>
@@ -6524,25 +7174,1104 @@
             <p:ph idx="1"/>
           </p:nvPr>
         </p:nvSpPr>
-        <p:spPr/>
-        <p:txBody>
-          <a:bodyPr/>
+        <p:spPr>
+          <a:xfrm>
+            <a:off x="1371600" y="4696535"/>
+            <a:ext cx="9180124" cy="1960359"/>
+          </a:xfrm>
+        </p:spPr>
+        <p:txBody>
+          <a:bodyPr vert="horz" lIns="91440" tIns="45720" rIns="91440" bIns="45720" rtlCol="0" anchor="t">
+            <a:normAutofit/>
+          </a:bodyPr>
           <a:lstStyle/>
           <a:p>
-            <a:endParaRPr lang="pt-BR"/>
-          </a:p>
-        </p:txBody>
-      </p:sp>
+            <a:pPr marL="0" indent="0">
+              <a:buNone/>
+            </a:pPr>
+            <a:r>
+              <a:rPr lang="en-US" sz="2000" dirty="0" err="1"/>
+              <a:t>Redução</a:t>
+            </a:r>
+            <a:r>
+              <a:rPr lang="en-US" sz="2000" dirty="0"/>
+              <a:t> das </a:t>
+            </a:r>
+            <a:r>
+              <a:rPr lang="en-US" sz="2000" dirty="0" err="1"/>
+              <a:t>Desigualdades</a:t>
+            </a:r>
+            <a:r>
+              <a:rPr lang="en-US" sz="2000" dirty="0"/>
+              <a:t>:</a:t>
+            </a:r>
+          </a:p>
+          <a:p>
+            <a:r>
+              <a:rPr lang="en-US" sz="2000" dirty="0">
+                <a:gradFill flip="none">
+                  <a:gsLst>
+                    <a:gs pos="0">
+                      <a:srgbClr val="FFFFFF"/>
+                    </a:gs>
+                    <a:gs pos="100000">
+                      <a:srgbClr val="FFFFFF"/>
+                    </a:gs>
+                  </a:gsLst>
+                  <a:lin ang="5580000" scaled="0"/>
+                  <a:tileRect/>
+                </a:gradFill>
+              </a:rPr>
+              <a:t>Todos </a:t>
+            </a:r>
+            <a:r>
+              <a:rPr lang="en-US" sz="2000" dirty="0" err="1">
+                <a:gradFill flip="none">
+                  <a:gsLst>
+                    <a:gs pos="0">
+                      <a:srgbClr val="FFFFFF"/>
+                    </a:gs>
+                    <a:gs pos="100000">
+                      <a:srgbClr val="FFFFFF"/>
+                    </a:gs>
+                  </a:gsLst>
+                  <a:lin ang="5580000" scaled="0"/>
+                  <a:tileRect/>
+                </a:gradFill>
+              </a:rPr>
+              <a:t>possuem</a:t>
+            </a:r>
+            <a:r>
+              <a:rPr lang="en-US" dirty="0">
+                <a:gradFill flip="none">
+                  <a:gsLst>
+                    <a:gs pos="0">
+                      <a:srgbClr val="FFFFFF"/>
+                    </a:gs>
+                    <a:gs pos="100000">
+                      <a:srgbClr val="FFFFFF"/>
+                    </a:gs>
+                  </a:gsLst>
+                  <a:lin ang="5580000" scaled="0"/>
+                  <a:tileRect/>
+                </a:gradFill>
+              </a:rPr>
+              <a:t> </a:t>
+            </a:r>
+            <a:r>
+              <a:rPr lang="en-US" dirty="0" err="1">
+                <a:gradFill flip="none">
+                  <a:gsLst>
+                    <a:gs pos="0">
+                      <a:srgbClr val="FFFFFF"/>
+                    </a:gs>
+                    <a:gs pos="100000">
+                      <a:srgbClr val="FFFFFF"/>
+                    </a:gs>
+                  </a:gsLst>
+                  <a:lin ang="5580000" scaled="0"/>
+                  <a:tileRect/>
+                </a:gradFill>
+              </a:rPr>
+              <a:t>os</a:t>
+            </a:r>
+            <a:r>
+              <a:rPr lang="en-US" dirty="0">
+                <a:gradFill flip="none">
+                  <a:gsLst>
+                    <a:gs pos="0">
+                      <a:srgbClr val="FFFFFF"/>
+                    </a:gs>
+                    <a:gs pos="100000">
+                      <a:srgbClr val="FFFFFF"/>
+                    </a:gs>
+                  </a:gsLst>
+                  <a:lin ang="5580000" scaled="0"/>
+                  <a:tileRect/>
+                </a:gradFill>
+              </a:rPr>
+              <a:t> </a:t>
+            </a:r>
+            <a:r>
+              <a:rPr lang="en-US" dirty="0" err="1">
+                <a:gradFill flip="none">
+                  <a:gsLst>
+                    <a:gs pos="0">
+                      <a:srgbClr val="FFFFFF"/>
+                    </a:gs>
+                    <a:gs pos="100000">
+                      <a:srgbClr val="FFFFFF"/>
+                    </a:gs>
+                  </a:gsLst>
+                  <a:lin ang="5580000" scaled="0"/>
+                  <a:tileRect/>
+                </a:gradFill>
+              </a:rPr>
+              <a:t>mesmos</a:t>
+            </a:r>
+            <a:r>
+              <a:rPr lang="en-US" dirty="0">
+                <a:gradFill flip="none">
+                  <a:gsLst>
+                    <a:gs pos="0">
+                      <a:srgbClr val="FFFFFF"/>
+                    </a:gs>
+                    <a:gs pos="100000">
+                      <a:srgbClr val="FFFFFF"/>
+                    </a:gs>
+                  </a:gsLst>
+                  <a:lin ang="5580000" scaled="0"/>
+                  <a:tileRect/>
+                </a:gradFill>
+              </a:rPr>
+              <a:t> </a:t>
+            </a:r>
+            <a:r>
+              <a:rPr lang="en-US" dirty="0" err="1">
+                <a:gradFill flip="none">
+                  <a:gsLst>
+                    <a:gs pos="0">
+                      <a:srgbClr val="FFFFFF"/>
+                    </a:gs>
+                    <a:gs pos="100000">
+                      <a:srgbClr val="FFFFFF"/>
+                    </a:gs>
+                  </a:gsLst>
+                  <a:lin ang="5580000" scaled="0"/>
+                  <a:tileRect/>
+                </a:gradFill>
+              </a:rPr>
+              <a:t>direitos</a:t>
+            </a:r>
+            <a:r>
+              <a:rPr lang="en-US" dirty="0">
+                <a:gradFill flip="none">
+                  <a:gsLst>
+                    <a:gs pos="0">
+                      <a:srgbClr val="FFFFFF"/>
+                    </a:gs>
+                    <a:gs pos="100000">
+                      <a:srgbClr val="FFFFFF"/>
+                    </a:gs>
+                  </a:gsLst>
+                  <a:lin ang="5580000" scaled="0"/>
+                  <a:tileRect/>
+                </a:gradFill>
+              </a:rPr>
+              <a:t> e </a:t>
+            </a:r>
+            <a:r>
+              <a:rPr lang="en-US" dirty="0" err="1">
+                <a:gradFill flip="none">
+                  <a:gsLst>
+                    <a:gs pos="0">
+                      <a:srgbClr val="FFFFFF"/>
+                    </a:gs>
+                    <a:gs pos="100000">
+                      <a:srgbClr val="FFFFFF"/>
+                    </a:gs>
+                  </a:gsLst>
+                  <a:lin ang="5580000" scaled="0"/>
+                  <a:tileRect/>
+                </a:gradFill>
+              </a:rPr>
+              <a:t>possibilidades</a:t>
+            </a:r>
+            <a:r>
+              <a:rPr lang="en-US" dirty="0">
+                <a:gradFill flip="none">
+                  <a:gsLst>
+                    <a:gs pos="0">
+                      <a:srgbClr val="FFFFFF"/>
+                    </a:gs>
+                    <a:gs pos="100000">
+                      <a:srgbClr val="FFFFFF"/>
+                    </a:gs>
+                  </a:gsLst>
+                  <a:lin ang="5580000" scaled="0"/>
+                  <a:tileRect/>
+                </a:gradFill>
+              </a:rPr>
+              <a:t>;</a:t>
+            </a:r>
+            <a:endParaRPr lang="en-US" dirty="0" err="1">
+              <a:gradFill flip="none">
+                <a:gsLst>
+                  <a:gs pos="0">
+                    <a:srgbClr val="FFFFFF"/>
+                  </a:gs>
+                  <a:gs pos="100000">
+                    <a:srgbClr val="FFFFFF"/>
+                  </a:gs>
+                </a:gsLst>
+                <a:lin ang="5580000" scaled="0"/>
+                <a:tileRect/>
+              </a:gradFill>
+            </a:endParaRPr>
+          </a:p>
+          <a:p>
+            <a:pPr>
+              <a:buClr>
+                <a:srgbClr val="FFFFFF"/>
+              </a:buClr>
+            </a:pPr>
+            <a:r>
+              <a:rPr lang="en-US" dirty="0" err="1">
+                <a:gradFill flip="none">
+                  <a:gsLst>
+                    <a:gs pos="0">
+                      <a:srgbClr val="FFFFFF"/>
+                    </a:gs>
+                    <a:gs pos="100000">
+                      <a:srgbClr val="FFFFFF"/>
+                    </a:gs>
+                  </a:gsLst>
+                  <a:lin ang="5580000" scaled="0"/>
+                  <a:tileRect/>
+                </a:gradFill>
+                <a:effectLst>
+                  <a:glow rad="38100">
+                    <a:prstClr val="black">
+                      <a:lumMod val="50000"/>
+                      <a:lumOff val="50000"/>
+                      <a:alpha val="20000"/>
+                    </a:prstClr>
+                  </a:glow>
+                  <a:outerShdw blurRad="44450" dist="12700" dir="13860000" algn="tl" rotWithShape="0">
+                    <a:srgbClr val="000000">
+                      <a:alpha val="20000"/>
+                    </a:srgbClr>
+                  </a:outerShdw>
+                </a:effectLst>
+              </a:rPr>
+              <a:t>Você</a:t>
+            </a:r>
+            <a:r>
+              <a:rPr lang="en-US" dirty="0">
+                <a:gradFill flip="none">
+                  <a:gsLst>
+                    <a:gs pos="0">
+                      <a:srgbClr val="FFFFFF"/>
+                    </a:gs>
+                    <a:gs pos="100000">
+                      <a:srgbClr val="FFFFFF"/>
+                    </a:gs>
+                  </a:gsLst>
+                  <a:lin ang="5580000" scaled="0"/>
+                  <a:tileRect/>
+                </a:gradFill>
+                <a:effectLst>
+                  <a:glow rad="38100">
+                    <a:prstClr val="black">
+                      <a:lumMod val="50000"/>
+                      <a:lumOff val="50000"/>
+                      <a:alpha val="20000"/>
+                    </a:prstClr>
+                  </a:glow>
+                  <a:outerShdw blurRad="44450" dist="12700" dir="13860000" algn="tl" rotWithShape="0">
+                    <a:srgbClr val="000000">
+                      <a:alpha val="20000"/>
+                    </a:srgbClr>
+                  </a:outerShdw>
+                </a:effectLst>
+              </a:rPr>
+              <a:t> </a:t>
+            </a:r>
+            <a:r>
+              <a:rPr lang="en-US" dirty="0" err="1">
+                <a:gradFill flip="none">
+                  <a:gsLst>
+                    <a:gs pos="0">
+                      <a:srgbClr val="FFFFFF"/>
+                    </a:gs>
+                    <a:gs pos="100000">
+                      <a:srgbClr val="FFFFFF"/>
+                    </a:gs>
+                  </a:gsLst>
+                  <a:lin ang="5580000" scaled="0"/>
+                  <a:tileRect/>
+                </a:gradFill>
+                <a:effectLst>
+                  <a:glow rad="38100">
+                    <a:prstClr val="black">
+                      <a:lumMod val="50000"/>
+                      <a:lumOff val="50000"/>
+                      <a:alpha val="20000"/>
+                    </a:prstClr>
+                  </a:glow>
+                  <a:outerShdw blurRad="44450" dist="12700" dir="13860000" algn="tl" rotWithShape="0">
+                    <a:srgbClr val="000000">
+                      <a:alpha val="20000"/>
+                    </a:srgbClr>
+                  </a:outerShdw>
+                </a:effectLst>
+              </a:rPr>
+              <a:t>escolhe</a:t>
+            </a:r>
+            <a:r>
+              <a:rPr lang="en-US" dirty="0">
+                <a:gradFill flip="none">
+                  <a:gsLst>
+                    <a:gs pos="0">
+                      <a:srgbClr val="FFFFFF"/>
+                    </a:gs>
+                    <a:gs pos="100000">
+                      <a:srgbClr val="FFFFFF"/>
+                    </a:gs>
+                  </a:gsLst>
+                  <a:lin ang="5580000" scaled="0"/>
+                  <a:tileRect/>
+                </a:gradFill>
+                <a:effectLst>
+                  <a:glow rad="38100">
+                    <a:prstClr val="black">
+                      <a:lumMod val="50000"/>
+                      <a:lumOff val="50000"/>
+                      <a:alpha val="20000"/>
+                    </a:prstClr>
+                  </a:glow>
+                  <a:outerShdw blurRad="44450" dist="12700" dir="13860000" algn="tl" rotWithShape="0">
+                    <a:srgbClr val="000000">
+                      <a:alpha val="20000"/>
+                    </a:srgbClr>
+                  </a:outerShdw>
+                </a:effectLst>
+              </a:rPr>
+              <a:t> o </a:t>
+            </a:r>
+            <a:r>
+              <a:rPr lang="en-US" dirty="0" err="1">
+                <a:gradFill flip="none">
+                  <a:gsLst>
+                    <a:gs pos="0">
+                      <a:srgbClr val="FFFFFF"/>
+                    </a:gs>
+                    <a:gs pos="100000">
+                      <a:srgbClr val="FFFFFF"/>
+                    </a:gs>
+                  </a:gsLst>
+                  <a:lin ang="5580000" scaled="0"/>
+                  <a:tileRect/>
+                </a:gradFill>
+                <a:effectLst>
+                  <a:glow rad="38100">
+                    <a:prstClr val="black">
+                      <a:lumMod val="50000"/>
+                      <a:lumOff val="50000"/>
+                      <a:alpha val="20000"/>
+                    </a:prstClr>
+                  </a:glow>
+                  <a:outerShdw blurRad="44450" dist="12700" dir="13860000" algn="tl" rotWithShape="0">
+                    <a:srgbClr val="000000">
+                      <a:alpha val="20000"/>
+                    </a:srgbClr>
+                  </a:outerShdw>
+                </a:effectLst>
+              </a:rPr>
+              <a:t>seu</a:t>
+            </a:r>
+            <a:r>
+              <a:rPr lang="en-US" dirty="0">
+                <a:gradFill flip="none">
+                  <a:gsLst>
+                    <a:gs pos="0">
+                      <a:srgbClr val="FFFFFF"/>
+                    </a:gs>
+                    <a:gs pos="100000">
+                      <a:srgbClr val="FFFFFF"/>
+                    </a:gs>
+                  </a:gsLst>
+                  <a:lin ang="5580000" scaled="0"/>
+                  <a:tileRect/>
+                </a:gradFill>
+                <a:effectLst>
+                  <a:glow rad="38100">
+                    <a:prstClr val="black">
+                      <a:lumMod val="50000"/>
+                      <a:lumOff val="50000"/>
+                      <a:alpha val="20000"/>
+                    </a:prstClr>
+                  </a:glow>
+                  <a:outerShdw blurRad="44450" dist="12700" dir="13860000" algn="tl" rotWithShape="0">
+                    <a:srgbClr val="000000">
+                      <a:alpha val="20000"/>
+                    </a:srgbClr>
+                  </a:outerShdw>
+                </a:effectLst>
+              </a:rPr>
+              <a:t> </a:t>
+            </a:r>
+            <a:r>
+              <a:rPr lang="en-US" dirty="0" err="1">
+                <a:gradFill flip="none">
+                  <a:gsLst>
+                    <a:gs pos="0">
+                      <a:srgbClr val="FFFFFF"/>
+                    </a:gs>
+                    <a:gs pos="100000">
+                      <a:srgbClr val="FFFFFF"/>
+                    </a:gs>
+                  </a:gsLst>
+                  <a:lin ang="5580000" scaled="0"/>
+                  <a:tileRect/>
+                </a:gradFill>
+                <a:effectLst>
+                  <a:glow rad="38100">
+                    <a:prstClr val="black">
+                      <a:lumMod val="50000"/>
+                      <a:lumOff val="50000"/>
+                      <a:alpha val="20000"/>
+                    </a:prstClr>
+                  </a:glow>
+                  <a:outerShdw blurRad="44450" dist="12700" dir="13860000" algn="tl" rotWithShape="0">
+                    <a:srgbClr val="000000">
+                      <a:alpha val="20000"/>
+                    </a:srgbClr>
+                  </a:outerShdw>
+                </a:effectLst>
+              </a:rPr>
+              <a:t>próprio</a:t>
+            </a:r>
+            <a:r>
+              <a:rPr lang="en-US" dirty="0">
+                <a:gradFill flip="none">
+                  <a:gsLst>
+                    <a:gs pos="0">
+                      <a:srgbClr val="FFFFFF"/>
+                    </a:gs>
+                    <a:gs pos="100000">
+                      <a:srgbClr val="FFFFFF"/>
+                    </a:gs>
+                  </a:gsLst>
+                  <a:lin ang="5580000" scaled="0"/>
+                  <a:tileRect/>
+                </a:gradFill>
+                <a:effectLst>
+                  <a:glow rad="38100">
+                    <a:prstClr val="black">
+                      <a:lumMod val="50000"/>
+                      <a:lumOff val="50000"/>
+                      <a:alpha val="20000"/>
+                    </a:prstClr>
+                  </a:glow>
+                  <a:outerShdw blurRad="44450" dist="12700" dir="13860000" algn="tl" rotWithShape="0">
+                    <a:srgbClr val="000000">
+                      <a:alpha val="20000"/>
+                    </a:srgbClr>
+                  </a:outerShdw>
+                </a:effectLst>
+              </a:rPr>
+              <a:t> </a:t>
+            </a:r>
+            <a:r>
+              <a:rPr lang="en-US" dirty="0" err="1">
+                <a:gradFill flip="none">
+                  <a:gsLst>
+                    <a:gs pos="0">
+                      <a:srgbClr val="FFFFFF"/>
+                    </a:gs>
+                    <a:gs pos="100000">
+                      <a:srgbClr val="FFFFFF"/>
+                    </a:gs>
+                  </a:gsLst>
+                  <a:lin ang="5580000" scaled="0"/>
+                  <a:tileRect/>
+                </a:gradFill>
+                <a:effectLst>
+                  <a:glow rad="38100">
+                    <a:prstClr val="black">
+                      <a:lumMod val="50000"/>
+                      <a:lumOff val="50000"/>
+                      <a:alpha val="20000"/>
+                    </a:prstClr>
+                  </a:glow>
+                  <a:outerShdw blurRad="44450" dist="12700" dir="13860000" algn="tl" rotWithShape="0">
+                    <a:srgbClr val="000000">
+                      <a:alpha val="20000"/>
+                    </a:srgbClr>
+                  </a:outerShdw>
+                </a:effectLst>
+              </a:rPr>
+              <a:t>caminho</a:t>
+            </a:r>
+            <a:r>
+              <a:rPr lang="en-US" dirty="0">
+                <a:gradFill flip="none">
+                  <a:gsLst>
+                    <a:gs pos="0">
+                      <a:srgbClr val="FFFFFF"/>
+                    </a:gs>
+                    <a:gs pos="100000">
+                      <a:srgbClr val="FFFFFF"/>
+                    </a:gs>
+                  </a:gsLst>
+                  <a:lin ang="5580000" scaled="0"/>
+                  <a:tileRect/>
+                </a:gradFill>
+                <a:effectLst>
+                  <a:glow rad="38100">
+                    <a:prstClr val="black">
+                      <a:lumMod val="50000"/>
+                      <a:lumOff val="50000"/>
+                      <a:alpha val="20000"/>
+                    </a:prstClr>
+                  </a:glow>
+                  <a:outerShdw blurRad="44450" dist="12700" dir="13860000" algn="tl" rotWithShape="0">
+                    <a:srgbClr val="000000">
+                      <a:alpha val="20000"/>
+                    </a:srgbClr>
+                  </a:outerShdw>
+                </a:effectLst>
+              </a:rPr>
+              <a:t>!</a:t>
+            </a:r>
+          </a:p>
+          <a:p>
+            <a:pPr>
+              <a:buClr>
+                <a:srgbClr val="FFFFFF"/>
+              </a:buClr>
+            </a:pPr>
+            <a:r>
+              <a:rPr lang="en-US" dirty="0">
+                <a:gradFill flip="none">
+                  <a:gsLst>
+                    <a:gs pos="0">
+                      <a:srgbClr val="FFFFFF"/>
+                    </a:gs>
+                    <a:gs pos="100000">
+                      <a:srgbClr val="FFFFFF"/>
+                    </a:gs>
+                  </a:gsLst>
+                  <a:lin ang="5580000" scaled="0"/>
+                  <a:tileRect/>
+                </a:gradFill>
+                <a:effectLst>
+                  <a:glow rad="38100">
+                    <a:prstClr val="black">
+                      <a:lumMod val="50000"/>
+                      <a:lumOff val="50000"/>
+                      <a:alpha val="20000"/>
+                    </a:prstClr>
+                  </a:glow>
+                  <a:outerShdw blurRad="44450" dist="12700" dir="13860000" algn="tl" rotWithShape="0">
+                    <a:srgbClr val="000000">
+                      <a:alpha val="20000"/>
+                    </a:srgbClr>
+                  </a:outerShdw>
+                </a:effectLst>
+              </a:rPr>
+              <a:t>Seja </a:t>
+            </a:r>
+            <a:r>
+              <a:rPr lang="en-US" dirty="0" err="1">
+                <a:gradFill flip="none">
+                  <a:gsLst>
+                    <a:gs pos="0">
+                      <a:srgbClr val="FFFFFF"/>
+                    </a:gs>
+                    <a:gs pos="100000">
+                      <a:srgbClr val="FFFFFF"/>
+                    </a:gs>
+                  </a:gsLst>
+                  <a:lin ang="5580000" scaled="0"/>
+                  <a:tileRect/>
+                </a:gradFill>
+                <a:effectLst>
+                  <a:glow rad="38100">
+                    <a:prstClr val="black">
+                      <a:lumMod val="50000"/>
+                      <a:lumOff val="50000"/>
+                      <a:alpha val="20000"/>
+                    </a:prstClr>
+                  </a:glow>
+                  <a:outerShdw blurRad="44450" dist="12700" dir="13860000" algn="tl" rotWithShape="0">
+                    <a:srgbClr val="000000">
+                      <a:alpha val="20000"/>
+                    </a:srgbClr>
+                  </a:outerShdw>
+                </a:effectLst>
+              </a:rPr>
+              <a:t>como</a:t>
+            </a:r>
+            <a:r>
+              <a:rPr lang="en-US" dirty="0">
+                <a:gradFill flip="none">
+                  <a:gsLst>
+                    <a:gs pos="0">
+                      <a:srgbClr val="FFFFFF"/>
+                    </a:gs>
+                    <a:gs pos="100000">
+                      <a:srgbClr val="FFFFFF"/>
+                    </a:gs>
+                  </a:gsLst>
+                  <a:lin ang="5580000" scaled="0"/>
+                  <a:tileRect/>
+                </a:gradFill>
+                <a:effectLst>
+                  <a:glow rad="38100">
+                    <a:prstClr val="black">
+                      <a:lumMod val="50000"/>
+                      <a:lumOff val="50000"/>
+                      <a:alpha val="20000"/>
+                    </a:prstClr>
+                  </a:glow>
+                  <a:outerShdw blurRad="44450" dist="12700" dir="13860000" algn="tl" rotWithShape="0">
+                    <a:srgbClr val="000000">
+                      <a:alpha val="20000"/>
+                    </a:srgbClr>
+                  </a:outerShdw>
+                </a:effectLst>
+              </a:rPr>
+              <a:t> </a:t>
+            </a:r>
+            <a:r>
+              <a:rPr lang="en-US" dirty="0" err="1">
+                <a:gradFill flip="none">
+                  <a:gsLst>
+                    <a:gs pos="0">
+                      <a:srgbClr val="FFFFFF"/>
+                    </a:gs>
+                    <a:gs pos="100000">
+                      <a:srgbClr val="FFFFFF"/>
+                    </a:gs>
+                  </a:gsLst>
+                  <a:lin ang="5580000" scaled="0"/>
+                  <a:tileRect/>
+                </a:gradFill>
+                <a:effectLst>
+                  <a:glow rad="38100">
+                    <a:prstClr val="black">
+                      <a:lumMod val="50000"/>
+                      <a:lumOff val="50000"/>
+                      <a:alpha val="20000"/>
+                    </a:prstClr>
+                  </a:glow>
+                  <a:outerShdw blurRad="44450" dist="12700" dir="13860000" algn="tl" rotWithShape="0">
+                    <a:srgbClr val="000000">
+                      <a:alpha val="20000"/>
+                    </a:srgbClr>
+                  </a:outerShdw>
+                </a:effectLst>
+              </a:rPr>
+              <a:t>você</a:t>
+            </a:r>
+            <a:r>
+              <a:rPr lang="en-US" dirty="0">
+                <a:gradFill flip="none">
+                  <a:gsLst>
+                    <a:gs pos="0">
+                      <a:srgbClr val="FFFFFF"/>
+                    </a:gs>
+                    <a:gs pos="100000">
+                      <a:srgbClr val="FFFFFF"/>
+                    </a:gs>
+                  </a:gsLst>
+                  <a:lin ang="5580000" scaled="0"/>
+                  <a:tileRect/>
+                </a:gradFill>
+                <a:effectLst>
+                  <a:glow rad="38100">
+                    <a:prstClr val="black">
+                      <a:lumMod val="50000"/>
+                      <a:lumOff val="50000"/>
+                      <a:alpha val="20000"/>
+                    </a:prstClr>
+                  </a:glow>
+                  <a:outerShdw blurRad="44450" dist="12700" dir="13860000" algn="tl" rotWithShape="0">
+                    <a:srgbClr val="000000">
+                      <a:alpha val="20000"/>
+                    </a:srgbClr>
+                  </a:outerShdw>
+                </a:effectLst>
+              </a:rPr>
+              <a:t> </a:t>
+            </a:r>
+            <a:r>
+              <a:rPr lang="en-US" dirty="0" err="1">
+                <a:gradFill flip="none">
+                  <a:gsLst>
+                    <a:gs pos="0">
+                      <a:srgbClr val="FFFFFF"/>
+                    </a:gs>
+                    <a:gs pos="100000">
+                      <a:srgbClr val="FFFFFF"/>
+                    </a:gs>
+                  </a:gsLst>
+                  <a:lin ang="5580000" scaled="0"/>
+                  <a:tileRect/>
+                </a:gradFill>
+                <a:effectLst>
+                  <a:glow rad="38100">
+                    <a:prstClr val="black">
+                      <a:lumMod val="50000"/>
+                      <a:lumOff val="50000"/>
+                      <a:alpha val="20000"/>
+                    </a:prstClr>
+                  </a:glow>
+                  <a:outerShdw blurRad="44450" dist="12700" dir="13860000" algn="tl" rotWithShape="0">
+                    <a:srgbClr val="000000">
+                      <a:alpha val="20000"/>
+                    </a:srgbClr>
+                  </a:outerShdw>
+                </a:effectLst>
+              </a:rPr>
+              <a:t>quiser</a:t>
+            </a:r>
+            <a:r>
+              <a:rPr lang="en-US" dirty="0">
+                <a:gradFill flip="none">
+                  <a:gsLst>
+                    <a:gs pos="0">
+                      <a:srgbClr val="FFFFFF"/>
+                    </a:gs>
+                    <a:gs pos="100000">
+                      <a:srgbClr val="FFFFFF"/>
+                    </a:gs>
+                  </a:gsLst>
+                  <a:lin ang="5580000" scaled="0"/>
+                  <a:tileRect/>
+                </a:gradFill>
+                <a:effectLst>
+                  <a:glow rad="38100">
+                    <a:prstClr val="black">
+                      <a:lumMod val="50000"/>
+                      <a:lumOff val="50000"/>
+                      <a:alpha val="20000"/>
+                    </a:prstClr>
+                  </a:glow>
+                  <a:outerShdw blurRad="44450" dist="12700" dir="13860000" algn="tl" rotWithShape="0">
+                    <a:srgbClr val="000000">
+                      <a:alpha val="20000"/>
+                    </a:srgbClr>
+                  </a:outerShdw>
+                </a:effectLst>
+              </a:rPr>
+              <a:t>!</a:t>
+            </a:r>
+          </a:p>
+        </p:txBody>
+      </p:sp>
+      <p:pic>
+        <p:nvPicPr>
+          <p:cNvPr id="5" name="Imagem 4" descr="Ícone&#10;&#10;O conteúdo gerado por IA pode estar incorreto.">
+            <a:extLst>
+              <a:ext uri="{FF2B5EF4-FFF2-40B4-BE49-F238E27FC236}">
+                <a16:creationId xmlns:a16="http://schemas.microsoft.com/office/drawing/2014/main" id="{3B93D69E-54C7-C2E2-EDE0-5DA8D4C1E3FC}"/>
+              </a:ext>
+            </a:extLst>
+          </p:cNvPr>
+          <p:cNvPicPr>
+            <a:picLocks noChangeAspect="1"/>
+          </p:cNvPicPr>
+          <p:nvPr/>
+        </p:nvPicPr>
+        <p:blipFill>
+          <a:blip r:embed="rId3"/>
+          <a:stretch>
+            <a:fillRect/>
+          </a:stretch>
+        </p:blipFill>
+        <p:spPr>
+          <a:xfrm>
+            <a:off x="4397785" y="1360482"/>
+            <a:ext cx="3336232" cy="3336232"/>
+          </a:xfrm>
+          <a:prstGeom prst="rect">
+            <a:avLst/>
+          </a:prstGeom>
+          <a:ln>
+            <a:noFill/>
+          </a:ln>
+          <a:effectLst>
+            <a:softEdge rad="112500"/>
+          </a:effectLst>
+        </p:spPr>
+      </p:pic>
     </p:spTree>
     <p:extLst>
       <p:ext uri="{BB962C8B-B14F-4D97-AF65-F5344CB8AC3E}">
-        <p14:creationId xmlns:p14="http://schemas.microsoft.com/office/powerpoint/2010/main" val="3059816306"/>
+        <p14:creationId xmlns:p14="http://schemas.microsoft.com/office/powerpoint/2010/main" val="4002625472"/>
       </p:ext>
     </p:extLst>
   </p:cSld>
   <p:clrMapOvr>
     <a:masterClrMapping/>
   </p:clrMapOvr>
+  <p:timing>
+    <p:tnLst>
+      <p:par>
+        <p:cTn id="1" dur="indefinite" restart="never" nodeType="tmRoot">
+          <p:childTnLst>
+            <p:seq concurrent="1" nextAc="seek">
+              <p:cTn id="2" dur="indefinite" nodeType="mainSeq">
+                <p:childTnLst>
+                  <p:par>
+                    <p:cTn id="3" fill="hold">
+                      <p:stCondLst>
+                        <p:cond delay="indefinite"/>
+                      </p:stCondLst>
+                      <p:childTnLst>
+                        <p:par>
+                          <p:cTn id="4" fill="hold">
+                            <p:stCondLst>
+                              <p:cond delay="0"/>
+                            </p:stCondLst>
+                            <p:childTnLst>
+                              <p:par>
+                                <p:cTn id="5" presetID="1" presetClass="entr" presetSubtype="0" fill="hold" nodeType="clickEffect">
+                                  <p:stCondLst>
+                                    <p:cond delay="0"/>
+                                  </p:stCondLst>
+                                  <p:childTnLst>
+                                    <p:set>
+                                      <p:cBhvr>
+                                        <p:cTn id="6" dur="1" fill="hold">
+                                          <p:stCondLst>
+                                            <p:cond delay="0"/>
+                                          </p:stCondLst>
+                                        </p:cTn>
+                                        <p:tgtEl>
+                                          <p:spTgt spid="5"/>
+                                        </p:tgtEl>
+                                        <p:attrNameLst>
+                                          <p:attrName>style.visibility</p:attrName>
+                                        </p:attrNameLst>
+                                      </p:cBhvr>
+                                      <p:to>
+                                        <p:strVal val="visible"/>
+                                      </p:to>
+                                    </p:set>
+                                  </p:childTnLst>
+                                </p:cTn>
+                              </p:par>
+                            </p:childTnLst>
+                          </p:cTn>
+                        </p:par>
+                      </p:childTnLst>
+                    </p:cTn>
+                  </p:par>
+                  <p:par>
+                    <p:cTn id="7" fill="hold">
+                      <p:stCondLst>
+                        <p:cond delay="indefinite"/>
+                      </p:stCondLst>
+                      <p:childTnLst>
+                        <p:par>
+                          <p:cTn id="8" fill="hold">
+                            <p:stCondLst>
+                              <p:cond delay="0"/>
+                            </p:stCondLst>
+                            <p:childTnLst>
+                              <p:par>
+                                <p:cTn id="9" presetID="1" presetClass="entr" presetSubtype="0" fill="hold" grpId="0" nodeType="clickEffect">
+                                  <p:stCondLst>
+                                    <p:cond delay="0"/>
+                                  </p:stCondLst>
+                                  <p:childTnLst>
+                                    <p:set>
+                                      <p:cBhvr>
+                                        <p:cTn id="10" dur="1" fill="hold">
+                                          <p:stCondLst>
+                                            <p:cond delay="0"/>
+                                          </p:stCondLst>
+                                        </p:cTn>
+                                        <p:tgtEl>
+                                          <p:spTgt spid="9">
+                                            <p:txEl>
+                                              <p:pRg st="0" end="0"/>
+                                            </p:txEl>
+                                          </p:spTgt>
+                                        </p:tgtEl>
+                                        <p:attrNameLst>
+                                          <p:attrName>style.visibility</p:attrName>
+                                        </p:attrNameLst>
+                                      </p:cBhvr>
+                                      <p:to>
+                                        <p:strVal val="visible"/>
+                                      </p:to>
+                                    </p:set>
+                                  </p:childTnLst>
+                                </p:cTn>
+                              </p:par>
+                            </p:childTnLst>
+                          </p:cTn>
+                        </p:par>
+                      </p:childTnLst>
+                    </p:cTn>
+                  </p:par>
+                  <p:par>
+                    <p:cTn id="11" fill="hold">
+                      <p:stCondLst>
+                        <p:cond delay="indefinite"/>
+                      </p:stCondLst>
+                      <p:childTnLst>
+                        <p:par>
+                          <p:cTn id="12" fill="hold">
+                            <p:stCondLst>
+                              <p:cond delay="0"/>
+                            </p:stCondLst>
+                            <p:childTnLst>
+                              <p:par>
+                                <p:cTn id="13" presetID="1" presetClass="entr" presetSubtype="0" fill="hold" grpId="0" nodeType="clickEffect">
+                                  <p:stCondLst>
+                                    <p:cond delay="0"/>
+                                  </p:stCondLst>
+                                  <p:childTnLst>
+                                    <p:set>
+                                      <p:cBhvr>
+                                        <p:cTn id="14" dur="1" fill="hold">
+                                          <p:stCondLst>
+                                            <p:cond delay="0"/>
+                                          </p:stCondLst>
+                                        </p:cTn>
+                                        <p:tgtEl>
+                                          <p:spTgt spid="9">
+                                            <p:txEl>
+                                              <p:pRg st="1" end="1"/>
+                                            </p:txEl>
+                                          </p:spTgt>
+                                        </p:tgtEl>
+                                        <p:attrNameLst>
+                                          <p:attrName>style.visibility</p:attrName>
+                                        </p:attrNameLst>
+                                      </p:cBhvr>
+                                      <p:to>
+                                        <p:strVal val="visible"/>
+                                      </p:to>
+                                    </p:set>
+                                  </p:childTnLst>
+                                </p:cTn>
+                              </p:par>
+                            </p:childTnLst>
+                          </p:cTn>
+                        </p:par>
+                      </p:childTnLst>
+                    </p:cTn>
+                  </p:par>
+                  <p:par>
+                    <p:cTn id="15" fill="hold">
+                      <p:stCondLst>
+                        <p:cond delay="indefinite"/>
+                      </p:stCondLst>
+                      <p:childTnLst>
+                        <p:par>
+                          <p:cTn id="16" fill="hold">
+                            <p:stCondLst>
+                              <p:cond delay="0"/>
+                            </p:stCondLst>
+                            <p:childTnLst>
+                              <p:par>
+                                <p:cTn id="17" presetID="1" presetClass="entr" presetSubtype="0" fill="hold" grpId="0" nodeType="clickEffect">
+                                  <p:stCondLst>
+                                    <p:cond delay="0"/>
+                                  </p:stCondLst>
+                                  <p:childTnLst>
+                                    <p:set>
+                                      <p:cBhvr>
+                                        <p:cTn id="18" dur="1" fill="hold">
+                                          <p:stCondLst>
+                                            <p:cond delay="0"/>
+                                          </p:stCondLst>
+                                        </p:cTn>
+                                        <p:tgtEl>
+                                          <p:spTgt spid="9">
+                                            <p:txEl>
+                                              <p:pRg st="2" end="2"/>
+                                            </p:txEl>
+                                          </p:spTgt>
+                                        </p:tgtEl>
+                                        <p:attrNameLst>
+                                          <p:attrName>style.visibility</p:attrName>
+                                        </p:attrNameLst>
+                                      </p:cBhvr>
+                                      <p:to>
+                                        <p:strVal val="visible"/>
+                                      </p:to>
+                                    </p:set>
+                                  </p:childTnLst>
+                                </p:cTn>
+                              </p:par>
+                            </p:childTnLst>
+                          </p:cTn>
+                        </p:par>
+                      </p:childTnLst>
+                    </p:cTn>
+                  </p:par>
+                  <p:par>
+                    <p:cTn id="19" fill="hold">
+                      <p:stCondLst>
+                        <p:cond delay="indefinite"/>
+                      </p:stCondLst>
+                      <p:childTnLst>
+                        <p:par>
+                          <p:cTn id="20" fill="hold">
+                            <p:stCondLst>
+                              <p:cond delay="0"/>
+                            </p:stCondLst>
+                            <p:childTnLst>
+                              <p:par>
+                                <p:cTn id="21" presetID="1" presetClass="entr" presetSubtype="0" fill="hold" grpId="0" nodeType="clickEffect">
+                                  <p:stCondLst>
+                                    <p:cond delay="0"/>
+                                  </p:stCondLst>
+                                  <p:childTnLst>
+                                    <p:set>
+                                      <p:cBhvr>
+                                        <p:cTn id="22" dur="1" fill="hold">
+                                          <p:stCondLst>
+                                            <p:cond delay="0"/>
+                                          </p:stCondLst>
+                                        </p:cTn>
+                                        <p:tgtEl>
+                                          <p:spTgt spid="9">
+                                            <p:txEl>
+                                              <p:pRg st="3" end="3"/>
+                                            </p:txEl>
+                                          </p:spTgt>
+                                        </p:tgtEl>
+                                        <p:attrNameLst>
+                                          <p:attrName>style.visibility</p:attrName>
+                                        </p:attrNameLst>
+                                      </p:cBhvr>
+                                      <p:to>
+                                        <p:strVal val="visible"/>
+                                      </p:to>
+                                    </p:set>
+                                  </p:childTnLst>
+                                </p:cTn>
+                              </p:par>
+                            </p:childTnLst>
+                          </p:cTn>
+                        </p:par>
+                      </p:childTnLst>
+                    </p:cTn>
+                  </p:par>
+                </p:childTnLst>
+              </p:cTn>
+              <p:prevCondLst>
+                <p:cond evt="onPrev" delay="0">
+                  <p:tgtEl>
+                    <p:sldTgt/>
+                  </p:tgtEl>
+                </p:cond>
+              </p:prevCondLst>
+              <p:nextCondLst>
+                <p:cond evt="onNext" delay="0">
+                  <p:tgtEl>
+                    <p:sldTgt/>
+                  </p:tgtEl>
+                </p:cond>
+              </p:nextCondLst>
+            </p:seq>
+          </p:childTnLst>
+        </p:cTn>
+      </p:par>
+    </p:tnLst>
+    <p:bldLst>
+      <p:bldP spid="9" grpId="0" build="p"/>
+    </p:bldLst>
+  </p:timing>
 </p:sld>
 </file>
 
@@ -6563,158 +8292,12 @@
           <a:chExt cx="0" cy="0"/>
         </a:xfrm>
       </p:grpSpPr>
-      <p:sp>
-        <p:nvSpPr>
-          <p:cNvPr id="2" name="Title 1">
+      <p:pic>
+        <p:nvPicPr>
+          <p:cNvPr id="8" name="Imagem 7" descr="Texto&#10;&#10;O conteúdo gerado por IA pode estar incorreto.">
             <a:extLst>
               <a:ext uri="{FF2B5EF4-FFF2-40B4-BE49-F238E27FC236}">
-                <a16:creationId xmlns:a16="http://schemas.microsoft.com/office/drawing/2014/main" id="{2EC9BAE3-3967-A05A-59B0-08F0D4D9400A}"/>
-              </a:ext>
-            </a:extLst>
-          </p:cNvPr>
-          <p:cNvSpPr>
-            <a:spLocks noGrp="1"/>
-          </p:cNvSpPr>
-          <p:nvPr>
-            <p:ph type="title"/>
-          </p:nvPr>
-        </p:nvSpPr>
-        <p:spPr>
-          <a:xfrm>
-            <a:off x="1371598" y="319314"/>
-            <a:ext cx="9477377" cy="1030515"/>
-          </a:xfrm>
-        </p:spPr>
-        <p:txBody>
-          <a:bodyPr anchor="ctr">
-            <a:normAutofit/>
-          </a:bodyPr>
-          <a:lstStyle/>
-          <a:p>
-            <a:r>
-              <a:rPr lang="pt-BR" sz="4000">
-                <a:solidFill>
-                  <a:srgbClr val="FFFFFF"/>
-                </a:solidFill>
-              </a:rPr>
-              <a:t>ODS</a:t>
-            </a:r>
-          </a:p>
-        </p:txBody>
-      </p:sp>
-      <p:sp>
-        <p:nvSpPr>
-          <p:cNvPr id="9" name="Content Placeholder 8">
-            <a:extLst>
-              <a:ext uri="{FF2B5EF4-FFF2-40B4-BE49-F238E27FC236}">
-                <a16:creationId xmlns:a16="http://schemas.microsoft.com/office/drawing/2014/main" id="{E363E1E1-62A0-8414-4A5A-979CC4DBF868}"/>
-              </a:ext>
-            </a:extLst>
-          </p:cNvPr>
-          <p:cNvSpPr>
-            <a:spLocks noGrp="1"/>
-          </p:cNvSpPr>
-          <p:nvPr>
-            <p:ph idx="1"/>
-          </p:nvPr>
-        </p:nvSpPr>
-        <p:spPr>
-          <a:xfrm>
-            <a:off x="1961071" y="5012837"/>
-            <a:ext cx="4047408" cy="1485907"/>
-          </a:xfrm>
-        </p:spPr>
-        <p:txBody>
-          <a:bodyPr vert="horz" lIns="91440" tIns="45720" rIns="91440" bIns="45720" rtlCol="0" anchor="t">
-            <a:normAutofit/>
-          </a:bodyPr>
-          <a:lstStyle/>
-          <a:p>
-            <a:pPr marL="0" indent="0">
-              <a:buNone/>
-            </a:pPr>
-            <a:r>
-              <a:rPr lang="en-US" sz="2000" dirty="0" err="1"/>
-              <a:t>Redução</a:t>
-            </a:r>
-            <a:r>
-              <a:rPr lang="en-US" sz="2000" dirty="0"/>
-              <a:t> das </a:t>
-            </a:r>
-            <a:r>
-              <a:rPr lang="en-US" sz="2000" dirty="0" err="1"/>
-              <a:t>Desigualdades</a:t>
-            </a:r>
-            <a:r>
-              <a:rPr lang="en-US" sz="2000" dirty="0"/>
-              <a:t>:</a:t>
-            </a:r>
-          </a:p>
-          <a:p>
-            <a:r>
-              <a:rPr lang="en-US" sz="2000" dirty="0"/>
-              <a:t>Todos </a:t>
-            </a:r>
-            <a:r>
-              <a:rPr lang="en-US" sz="2000" dirty="0" err="1"/>
-              <a:t>possuem</a:t>
-            </a:r>
-            <a:r>
-              <a:rPr lang="en-US" sz="2000" dirty="0"/>
-              <a:t> </a:t>
-            </a:r>
-            <a:r>
-              <a:rPr lang="en-US" sz="2000" dirty="0" err="1"/>
-              <a:t>acessos</a:t>
-            </a:r>
-            <a:r>
-              <a:rPr lang="en-US" sz="2000" dirty="0"/>
-              <a:t> </a:t>
-            </a:r>
-            <a:r>
-              <a:rPr lang="en-US" sz="2000" dirty="0" err="1"/>
-              <a:t>iguais</a:t>
-            </a:r>
-            <a:r>
-              <a:rPr lang="en-US" sz="2000" dirty="0"/>
-              <a:t>;</a:t>
-            </a:r>
-            <a:endParaRPr lang="en-US" sz="2000" dirty="0" err="1"/>
-          </a:p>
-          <a:p>
-            <a:r>
-              <a:rPr lang="en-US" sz="2000" dirty="0" err="1"/>
-              <a:t>Não</a:t>
-            </a:r>
-            <a:r>
-              <a:rPr lang="en-US" sz="2000" dirty="0"/>
-              <a:t> </a:t>
-            </a:r>
-            <a:r>
-              <a:rPr lang="en-US" sz="2000" dirty="0" err="1"/>
-              <a:t>existe</a:t>
-            </a:r>
-            <a:r>
-              <a:rPr lang="en-US" sz="2000" dirty="0"/>
-              <a:t> "</a:t>
-            </a:r>
-            <a:r>
-              <a:rPr lang="en-US" sz="2000" dirty="0" err="1"/>
-              <a:t>versão</a:t>
-            </a:r>
-            <a:r>
-              <a:rPr lang="en-US" sz="2000" dirty="0"/>
-              <a:t> premium".</a:t>
-            </a:r>
-          </a:p>
-        </p:txBody>
-      </p:sp>
-      <p:pic>
-        <p:nvPicPr>
-          <p:cNvPr id="5" name="Imagem 4" descr="Ícone&#10;&#10;O conteúdo gerado por IA pode estar incorreto.">
-            <a:extLst>
-              <a:ext uri="{FF2B5EF4-FFF2-40B4-BE49-F238E27FC236}">
-                <a16:creationId xmlns:a16="http://schemas.microsoft.com/office/drawing/2014/main" id="{3B93D69E-54C7-C2E2-EDE0-5DA8D4C1E3FC}"/>
+                <a16:creationId xmlns:a16="http://schemas.microsoft.com/office/drawing/2014/main" id="{2AA218E9-449E-AC11-B2A5-8A78F4F17249}"/>
               </a:ext>
             </a:extLst>
           </p:cNvPr>
@@ -6724,111 +8307,1008 @@
           <p:nvPr/>
         </p:nvPicPr>
         <p:blipFill>
-          <a:blip r:embed="rId2"/>
+          <a:blip r:embed="rId2">
+            <a:alphaModFix amt="10000"/>
+          </a:blip>
           <a:stretch>
             <a:fillRect/>
           </a:stretch>
         </p:blipFill>
         <p:spPr>
           <a:xfrm>
-            <a:off x="2499974" y="2122482"/>
-            <a:ext cx="2617365" cy="2617365"/>
+            <a:off x="2467" y="-373810"/>
+            <a:ext cx="12187065" cy="9402791"/>
           </a:xfrm>
           <a:prstGeom prst="rect">
             <a:avLst/>
           </a:prstGeom>
-          <a:ln>
-            <a:noFill/>
-          </a:ln>
-          <a:effectLst>
-            <a:softEdge rad="112500"/>
-          </a:effectLst>
         </p:spPr>
       </p:pic>
-      <p:pic>
-        <p:nvPicPr>
-          <p:cNvPr id="4" name="Content Placeholder 3">
+      <p:sp>
+        <p:nvSpPr>
+          <p:cNvPr id="2" name="Title 1">
             <a:extLst>
               <a:ext uri="{FF2B5EF4-FFF2-40B4-BE49-F238E27FC236}">
-                <a16:creationId xmlns:a16="http://schemas.microsoft.com/office/drawing/2014/main" id="{4A7E79EE-C351-7ADD-D8CC-AC6A159C655E}"/>
+                <a16:creationId xmlns:a16="http://schemas.microsoft.com/office/drawing/2014/main" id="{F61721BC-629F-0B93-3805-A1F69AB63965}"/>
               </a:ext>
             </a:extLst>
           </p:cNvPr>
-          <p:cNvPicPr>
-            <a:picLocks noChangeAspect="1"/>
-          </p:cNvPicPr>
-          <p:nvPr/>
-        </p:nvPicPr>
-        <p:blipFill>
-          <a:blip r:embed="rId3"/>
-          <a:stretch>
-            <a:fillRect/>
-          </a:stretch>
-        </p:blipFill>
+          <p:cNvSpPr>
+            <a:spLocks noGrp="1"/>
+          </p:cNvSpPr>
+          <p:nvPr>
+            <p:ph type="title"/>
+          </p:nvPr>
+        </p:nvSpPr>
+        <p:spPr/>
+        <p:txBody>
+          <a:bodyPr/>
+          <a:lstStyle/>
+          <a:p>
+            <a:pPr algn="ctr"/>
+            <a:r>
+              <a:rPr lang="pt-BR" dirty="0">
+                <a:gradFill flip="none">
+                  <a:gsLst>
+                    <a:gs pos="0">
+                      <a:srgbClr val="FFFFFF"/>
+                    </a:gs>
+                    <a:gs pos="100000">
+                      <a:srgbClr val="FFFFFF"/>
+                    </a:gs>
+                  </a:gsLst>
+                  <a:lin ang="5580000" scaled="0"/>
+                  <a:tileRect/>
+                </a:gradFill>
+                <a:effectLst>
+                  <a:glow rad="38100">
+                    <a:prstClr val="black">
+                      <a:lumMod val="65000"/>
+                      <a:lumOff val="35000"/>
+                      <a:alpha val="40000"/>
+                    </a:prstClr>
+                  </a:glow>
+                  <a:outerShdw blurRad="28575" dist="38100" dir="14040000" algn="tl" rotWithShape="0">
+                    <a:srgbClr val="000000">
+                      <a:alpha val="25000"/>
+                    </a:srgbClr>
+                  </a:outerShdw>
+                </a:effectLst>
+              </a:rPr>
+              <a:t>Porque jogos?</a:t>
+            </a:r>
+            <a:endParaRPr lang="pt-BR" dirty="0">
+              <a:gradFill flip="none" rotWithShape="1">
+                <a:gsLst>
+                  <a:gs pos="0">
+                    <a:prstClr val="white"/>
+                  </a:gs>
+                  <a:gs pos="100000">
+                    <a:prstClr val="white">
+                      <a:lumMod val="65000"/>
+                    </a:prstClr>
+                  </a:gs>
+                </a:gsLst>
+                <a:lin ang="5580000" scaled="0"/>
+                <a:tileRect/>
+              </a:gradFill>
+              <a:effectLst>
+                <a:glow rad="38100">
+                  <a:prstClr val="black">
+                    <a:lumMod val="65000"/>
+                    <a:lumOff val="35000"/>
+                    <a:alpha val="40000"/>
+                  </a:prstClr>
+                </a:glow>
+                <a:outerShdw blurRad="28575" dist="38100" dir="14040000" algn="tl" rotWithShape="0">
+                  <a:srgbClr val="000000">
+                    <a:alpha val="25000"/>
+                  </a:srgbClr>
+                </a:outerShdw>
+              </a:effectLst>
+            </a:endParaRPr>
+          </a:p>
+        </p:txBody>
+      </p:sp>
+      <p:sp>
+        <p:nvSpPr>
+          <p:cNvPr id="3" name="Content Placeholder 2">
+            <a:extLst>
+              <a:ext uri="{FF2B5EF4-FFF2-40B4-BE49-F238E27FC236}">
+                <a16:creationId xmlns:a16="http://schemas.microsoft.com/office/drawing/2014/main" id="{24AD9469-CC0E-1842-8625-195DEBE9C85F}"/>
+              </a:ext>
+            </a:extLst>
+          </p:cNvPr>
+          <p:cNvSpPr>
+            <a:spLocks noGrp="1"/>
+          </p:cNvSpPr>
+          <p:nvPr>
+            <p:ph idx="1"/>
+          </p:nvPr>
+        </p:nvSpPr>
         <p:spPr>
           <a:xfrm>
-            <a:off x="6684614" y="2117262"/>
-            <a:ext cx="2617365" cy="2617365"/>
+            <a:off x="1141413" y="2149414"/>
+            <a:ext cx="9905998" cy="3124201"/>
+          </a:xfrm>
+        </p:spPr>
+        <p:txBody>
+          <a:bodyPr vert="horz" lIns="91440" tIns="45720" rIns="91440" bIns="45720" rtlCol="0" anchor="t">
+            <a:normAutofit/>
+          </a:bodyPr>
+          <a:lstStyle/>
+          <a:p>
+            <a:r>
+              <a:rPr lang="pt-BR" dirty="0">
+                <a:gradFill flip="none">
+                  <a:gsLst>
+                    <a:gs pos="0">
+                      <a:srgbClr val="FFFFFF"/>
+                    </a:gs>
+                    <a:gs pos="100000">
+                      <a:srgbClr val="FFFFFF"/>
+                    </a:gs>
+                  </a:gsLst>
+                  <a:lin ang="5580000" scaled="0"/>
+                  <a:tileRect/>
+                </a:gradFill>
+                <a:effectLst>
+                  <a:glow rad="38100">
+                    <a:prstClr val="black">
+                      <a:lumMod val="50000"/>
+                      <a:lumOff val="50000"/>
+                      <a:alpha val="20000"/>
+                    </a:prstClr>
+                  </a:glow>
+                  <a:outerShdw blurRad="44450" dist="12700" dir="13860000" algn="tl" rotWithShape="0">
+                    <a:srgbClr val="000000">
+                      <a:alpha val="20000"/>
+                    </a:srgbClr>
+                  </a:outerShdw>
+                </a:effectLst>
+              </a:rPr>
+              <a:t>Nunca desistir!</a:t>
+            </a:r>
+            <a:endParaRPr lang="pt-BR" dirty="0"/>
+          </a:p>
+          <a:p>
+            <a:pPr>
+              <a:buClr>
+                <a:srgbClr val="FFFFFF"/>
+              </a:buClr>
+            </a:pPr>
+            <a:r>
+              <a:rPr lang="pt-BR" dirty="0">
+                <a:gradFill flip="none">
+                  <a:gsLst>
+                    <a:gs pos="0">
+                      <a:srgbClr val="FFFFFF"/>
+                    </a:gs>
+                    <a:gs pos="100000">
+                      <a:srgbClr val="FFFFFF"/>
+                    </a:gs>
+                  </a:gsLst>
+                  <a:lin ang="5580000" scaled="0"/>
+                  <a:tileRect/>
+                </a:gradFill>
+                <a:effectLst>
+                  <a:glow rad="38100">
+                    <a:prstClr val="black">
+                      <a:lumMod val="50000"/>
+                      <a:lumOff val="50000"/>
+                      <a:alpha val="20000"/>
+                    </a:prstClr>
+                  </a:glow>
+                  <a:outerShdw blurRad="44450" dist="12700" dir="13860000" algn="tl" rotWithShape="0">
+                    <a:srgbClr val="000000">
+                      <a:alpha val="20000"/>
+                    </a:srgbClr>
+                  </a:outerShdw>
+                </a:effectLst>
+              </a:rPr>
+              <a:t>Respeitar e Avaliar opiniões e pontos de vistas diferentes;</a:t>
+            </a:r>
+          </a:p>
+          <a:p>
+            <a:pPr>
+              <a:buClr>
+                <a:srgbClr val="FFFFFF"/>
+              </a:buClr>
+            </a:pPr>
+            <a:r>
+              <a:rPr lang="pt-BR" dirty="0">
+                <a:gradFill flip="none">
+                  <a:gsLst>
+                    <a:gs pos="0">
+                      <a:srgbClr val="FFFFFF"/>
+                    </a:gs>
+                    <a:gs pos="100000">
+                      <a:srgbClr val="FFFFFF"/>
+                    </a:gs>
+                  </a:gsLst>
+                  <a:lin ang="5580000" scaled="0"/>
+                  <a:tileRect/>
+                </a:gradFill>
+                <a:effectLst>
+                  <a:glow rad="38100">
+                    <a:prstClr val="black">
+                      <a:lumMod val="50000"/>
+                      <a:lumOff val="50000"/>
+                      <a:alpha val="20000"/>
+                    </a:prstClr>
+                  </a:glow>
+                  <a:outerShdw blurRad="44450" dist="12700" dir="13860000" algn="tl" rotWithShape="0">
+                    <a:srgbClr val="000000">
+                      <a:alpha val="20000"/>
+                    </a:srgbClr>
+                  </a:outerShdw>
+                </a:effectLst>
+              </a:rPr>
+              <a:t>Existem muitas formas de solucionar o mesmo problema;</a:t>
+            </a:r>
+          </a:p>
+          <a:p>
+            <a:pPr>
+              <a:buClr>
+                <a:srgbClr val="FFFFFF"/>
+              </a:buClr>
+            </a:pPr>
+            <a:r>
+              <a:rPr lang="pt-BR" dirty="0">
+                <a:gradFill flip="none">
+                  <a:gsLst>
+                    <a:gs pos="0">
+                      <a:srgbClr val="FFFFFF"/>
+                    </a:gs>
+                    <a:gs pos="100000">
+                      <a:srgbClr val="FFFFFF"/>
+                    </a:gs>
+                  </a:gsLst>
+                  <a:lin ang="5580000" scaled="0"/>
+                  <a:tileRect/>
+                </a:gradFill>
+                <a:effectLst>
+                  <a:glow rad="38100">
+                    <a:prstClr val="black">
+                      <a:lumMod val="50000"/>
+                      <a:lumOff val="50000"/>
+                      <a:alpha val="20000"/>
+                    </a:prstClr>
+                  </a:glow>
+                  <a:outerShdw blurRad="44450" dist="12700" dir="13860000" algn="tl" rotWithShape="0">
+                    <a:srgbClr val="000000">
+                      <a:alpha val="20000"/>
+                    </a:srgbClr>
+                  </a:outerShdw>
+                </a:effectLst>
+              </a:rPr>
+              <a:t>Avaliar os Riscos e Oportunidades.</a:t>
+            </a:r>
+          </a:p>
+        </p:txBody>
+      </p:sp>
+      <p:sp>
+        <p:nvSpPr>
+          <p:cNvPr id="5" name="Title 1">
+            <a:extLst>
+              <a:ext uri="{FF2B5EF4-FFF2-40B4-BE49-F238E27FC236}">
+                <a16:creationId xmlns:a16="http://schemas.microsoft.com/office/drawing/2014/main" id="{AB83F23E-2601-C71B-8C58-CFD1670C83CC}"/>
+              </a:ext>
+            </a:extLst>
+          </p:cNvPr>
+          <p:cNvSpPr txBox="1">
+            <a:spLocks/>
+          </p:cNvSpPr>
+          <p:nvPr/>
+        </p:nvSpPr>
+        <p:spPr>
+          <a:xfrm>
+            <a:off x="1135662" y="3378679"/>
+            <a:ext cx="9905998" cy="1905000"/>
           </a:xfrm>
           <a:prstGeom prst="rect">
             <a:avLst/>
           </a:prstGeom>
-          <a:ln>
-            <a:noFill/>
-          </a:ln>
-          <a:effectLst>
-            <a:softEdge rad="112500"/>
-          </a:effectLst>
         </p:spPr>
-      </p:pic>
-      <p:sp>
-        <p:nvSpPr>
-          <p:cNvPr id="6" name="CaixaDeTexto 5">
+        <p:txBody>
+          <a:bodyPr vert="horz" lIns="91440" tIns="45720" rIns="91440" bIns="45720" rtlCol="0" anchor="ctr">
+            <a:normAutofit/>
+          </a:bodyPr>
+          <a:lstStyle>
+            <a:lvl1pPr algn="l" defTabSz="457200" rtl="0" eaLnBrk="1" latinLnBrk="0" hangingPunct="1">
+              <a:spcBef>
+                <a:spcPct val="0"/>
+              </a:spcBef>
+              <a:buNone/>
+              <a:defRPr sz="3200" kern="1200" cap="all">
+                <a:ln w="3175" cmpd="sng">
+                  <a:noFill/>
+                </a:ln>
+                <a:gradFill flip="none" rotWithShape="1">
+                  <a:gsLst>
+                    <a:gs pos="0">
+                      <a:schemeClr val="tx1"/>
+                    </a:gs>
+                    <a:gs pos="100000">
+                      <a:schemeClr val="tx1">
+                        <a:lumMod val="65000"/>
+                      </a:schemeClr>
+                    </a:gs>
+                  </a:gsLst>
+                  <a:lin ang="5580000" scaled="0"/>
+                  <a:tileRect/>
+                </a:gradFill>
+                <a:effectLst>
+                  <a:glow rad="38100">
+                    <a:schemeClr val="bg1">
+                      <a:lumMod val="65000"/>
+                      <a:lumOff val="35000"/>
+                      <a:alpha val="40000"/>
+                    </a:schemeClr>
+                  </a:glow>
+                  <a:outerShdw blurRad="28575" dist="38100" dir="14040000" algn="tl" rotWithShape="0">
+                    <a:srgbClr val="000000">
+                      <a:alpha val="25000"/>
+                    </a:srgbClr>
+                  </a:outerShdw>
+                </a:effectLst>
+                <a:latin typeface="+mj-lt"/>
+                <a:ea typeface="+mj-ea"/>
+                <a:cs typeface="+mj-cs"/>
+              </a:defRPr>
+            </a:lvl1pPr>
+            <a:lvl2pPr eaLnBrk="1" hangingPunct="1">
+              <a:defRPr>
+                <a:solidFill>
+                  <a:schemeClr val="tx2"/>
+                </a:solidFill>
+              </a:defRPr>
+            </a:lvl2pPr>
+            <a:lvl3pPr eaLnBrk="1" hangingPunct="1">
+              <a:defRPr>
+                <a:solidFill>
+                  <a:schemeClr val="tx2"/>
+                </a:solidFill>
+              </a:defRPr>
+            </a:lvl3pPr>
+            <a:lvl4pPr eaLnBrk="1" hangingPunct="1">
+              <a:defRPr>
+                <a:solidFill>
+                  <a:schemeClr val="tx2"/>
+                </a:solidFill>
+              </a:defRPr>
+            </a:lvl4pPr>
+            <a:lvl5pPr eaLnBrk="1" hangingPunct="1">
+              <a:defRPr>
+                <a:solidFill>
+                  <a:schemeClr val="tx2"/>
+                </a:solidFill>
+              </a:defRPr>
+            </a:lvl5pPr>
+            <a:lvl6pPr eaLnBrk="1" hangingPunct="1">
+              <a:defRPr>
+                <a:solidFill>
+                  <a:schemeClr val="tx2"/>
+                </a:solidFill>
+              </a:defRPr>
+            </a:lvl6pPr>
+            <a:lvl7pPr eaLnBrk="1" hangingPunct="1">
+              <a:defRPr>
+                <a:solidFill>
+                  <a:schemeClr val="tx2"/>
+                </a:solidFill>
+              </a:defRPr>
+            </a:lvl7pPr>
+            <a:lvl8pPr eaLnBrk="1" hangingPunct="1">
+              <a:defRPr>
+                <a:solidFill>
+                  <a:schemeClr val="tx2"/>
+                </a:solidFill>
+              </a:defRPr>
+            </a:lvl8pPr>
+            <a:lvl9pPr eaLnBrk="1" hangingPunct="1">
+              <a:defRPr>
+                <a:solidFill>
+                  <a:schemeClr val="tx2"/>
+                </a:solidFill>
+              </a:defRPr>
+            </a:lvl9pPr>
+          </a:lstStyle>
+          <a:p>
+            <a:pPr algn="ctr"/>
+            <a:r>
+              <a:rPr lang="pt-BR" dirty="0">
+                <a:gradFill flip="none">
+                  <a:gsLst>
+                    <a:gs pos="0">
+                      <a:srgbClr val="FFFFFF"/>
+                    </a:gs>
+                    <a:gs pos="100000">
+                      <a:srgbClr val="FFFFFF"/>
+                    </a:gs>
+                  </a:gsLst>
+                  <a:lin ang="5580000" scaled="0"/>
+                  <a:tileRect/>
+                </a:gradFill>
+                <a:effectLst>
+                  <a:glow rad="38100">
+                    <a:prstClr val="black">
+                      <a:lumMod val="65000"/>
+                      <a:lumOff val="35000"/>
+                      <a:alpha val="40000"/>
+                    </a:prstClr>
+                  </a:glow>
+                  <a:outerShdw blurRad="28575" dist="38100" dir="14040000" algn="tl" rotWithShape="0">
+                    <a:srgbClr val="000000">
+                      <a:alpha val="25000"/>
+                    </a:srgbClr>
+                  </a:outerShdw>
+                </a:effectLst>
+              </a:rPr>
+              <a:t>Maiores desafios ...</a:t>
+            </a:r>
+          </a:p>
+        </p:txBody>
+      </p:sp>
+      <p:sp>
+        <p:nvSpPr>
+          <p:cNvPr id="7" name="Content Placeholder 2">
             <a:extLst>
               <a:ext uri="{FF2B5EF4-FFF2-40B4-BE49-F238E27FC236}">
-                <a16:creationId xmlns:a16="http://schemas.microsoft.com/office/drawing/2014/main" id="{AFAA88C1-2D7D-814E-F0E1-39F02B622E90}"/>
+                <a16:creationId xmlns:a16="http://schemas.microsoft.com/office/drawing/2014/main" id="{777C9D62-B33E-B7A8-0889-CA99DDBE1443}"/>
               </a:ext>
             </a:extLst>
           </p:cNvPr>
-          <p:cNvSpPr txBox="1"/>
+          <p:cNvSpPr txBox="1">
+            <a:spLocks/>
+          </p:cNvSpPr>
           <p:nvPr/>
         </p:nvSpPr>
         <p:spPr>
           <a:xfrm>
-            <a:off x="6522070" y="5009322"/>
-            <a:ext cx="4520366" cy="1323439"/>
+            <a:off x="1135662" y="4688455"/>
+            <a:ext cx="9905998" cy="3124201"/>
           </a:xfrm>
           <a:prstGeom prst="rect">
             <a:avLst/>
           </a:prstGeom>
-          <a:noFill/>
         </p:spPr>
         <p:txBody>
-          <a:bodyPr rot="0" spcFirstLastPara="0" vertOverflow="overflow" horzOverflow="overflow" vert="horz" wrap="square" lIns="91440" tIns="45720" rIns="91440" bIns="45720" numCol="1" spcCol="0" rtlCol="0" fromWordArt="0" anchor="t" anchorCtr="0" forceAA="0" compatLnSpc="1">
-            <a:prstTxWarp prst="textNoShape">
-              <a:avLst/>
-            </a:prstTxWarp>
-            <a:spAutoFit/>
+          <a:bodyPr vert="horz" lIns="91440" tIns="45720" rIns="91440" bIns="45720" rtlCol="0" anchor="t">
+            <a:normAutofit/>
           </a:bodyPr>
-          <a:lstStyle/>
-          <a:p>
-            <a:r>
-              <a:rPr lang="pt-BR" sz="2000" dirty="0"/>
-              <a:t>Educação de Qualidade:</a:t>
-            </a:r>
-          </a:p>
-          <a:p>
-            <a:r>
-              <a:rPr lang="pt-BR" sz="2000" dirty="0"/>
-              <a:t>Jogos educativos que incentivam a educação, </a:t>
-            </a:r>
-            <a:r>
-              <a:rPr lang="pt-BR" sz="2000" err="1"/>
-              <a:t>racíocinio</a:t>
-            </a:r>
-            <a:r>
-              <a:rPr lang="pt-BR" sz="2000" dirty="0"/>
-              <a:t> lógico, dentre outras habilidades.</a:t>
+          <a:lstStyle>
+            <a:lvl1pPr marL="285750" indent="-285750" algn="l" defTabSz="457200" rtl="0" eaLnBrk="1" latinLnBrk="0" hangingPunct="1">
+              <a:spcBef>
+                <a:spcPct val="20000"/>
+              </a:spcBef>
+              <a:spcAft>
+                <a:spcPts val="600"/>
+              </a:spcAft>
+              <a:buClr>
+                <a:schemeClr val="tx1"/>
+              </a:buClr>
+              <a:buSzPct val="100000"/>
+              <a:buFont typeface="Arial"/>
+              <a:buChar char="•"/>
+              <a:defRPr sz="2000" kern="1200" cap="small">
+                <a:gradFill flip="none" rotWithShape="1">
+                  <a:gsLst>
+                    <a:gs pos="0">
+                      <a:schemeClr val="tx1"/>
+                    </a:gs>
+                    <a:gs pos="100000">
+                      <a:schemeClr val="tx1">
+                        <a:lumMod val="75000"/>
+                      </a:schemeClr>
+                    </a:gs>
+                  </a:gsLst>
+                  <a:lin ang="5580000" scaled="0"/>
+                  <a:tileRect/>
+                </a:gradFill>
+                <a:effectLst>
+                  <a:glow rad="38100">
+                    <a:schemeClr val="bg1">
+                      <a:lumMod val="50000"/>
+                      <a:lumOff val="50000"/>
+                      <a:alpha val="20000"/>
+                    </a:schemeClr>
+                  </a:glow>
+                  <a:outerShdw blurRad="44450" dist="12700" dir="13860000" algn="tl" rotWithShape="0">
+                    <a:srgbClr val="000000">
+                      <a:alpha val="20000"/>
+                    </a:srgbClr>
+                  </a:outerShdw>
+                </a:effectLst>
+                <a:latin typeface="+mn-lt"/>
+                <a:ea typeface="+mn-ea"/>
+                <a:cs typeface="+mn-cs"/>
+              </a:defRPr>
+            </a:lvl1pPr>
+            <a:lvl2pPr marL="742950" indent="-285750" algn="l" defTabSz="457200" rtl="0" eaLnBrk="1" latinLnBrk="0" hangingPunct="1">
+              <a:spcBef>
+                <a:spcPct val="20000"/>
+              </a:spcBef>
+              <a:spcAft>
+                <a:spcPts val="600"/>
+              </a:spcAft>
+              <a:buClr>
+                <a:schemeClr val="tx1"/>
+              </a:buClr>
+              <a:buSzPct val="100000"/>
+              <a:buFont typeface="Arial"/>
+              <a:buChar char="•"/>
+              <a:defRPr sz="1800" kern="1200" cap="small">
+                <a:gradFill flip="none" rotWithShape="1">
+                  <a:gsLst>
+                    <a:gs pos="0">
+                      <a:schemeClr val="tx1"/>
+                    </a:gs>
+                    <a:gs pos="100000">
+                      <a:schemeClr val="tx1">
+                        <a:lumMod val="75000"/>
+                      </a:schemeClr>
+                    </a:gs>
+                  </a:gsLst>
+                  <a:lin ang="5580000" scaled="0"/>
+                  <a:tileRect/>
+                </a:gradFill>
+                <a:effectLst>
+                  <a:glow rad="38100">
+                    <a:schemeClr val="bg1">
+                      <a:lumMod val="50000"/>
+                      <a:lumOff val="50000"/>
+                      <a:alpha val="20000"/>
+                    </a:schemeClr>
+                  </a:glow>
+                  <a:outerShdw blurRad="44450" dist="12700" dir="13860000" algn="tl" rotWithShape="0">
+                    <a:srgbClr val="000000">
+                      <a:alpha val="20000"/>
+                    </a:srgbClr>
+                  </a:outerShdw>
+                </a:effectLst>
+                <a:latin typeface="+mn-lt"/>
+                <a:ea typeface="+mn-ea"/>
+                <a:cs typeface="+mn-cs"/>
+              </a:defRPr>
+            </a:lvl2pPr>
+            <a:lvl3pPr marL="1200150" indent="-285750" algn="l" defTabSz="457200" rtl="0" eaLnBrk="1" latinLnBrk="0" hangingPunct="1">
+              <a:spcBef>
+                <a:spcPct val="20000"/>
+              </a:spcBef>
+              <a:spcAft>
+                <a:spcPts val="600"/>
+              </a:spcAft>
+              <a:buClr>
+                <a:schemeClr val="tx1"/>
+              </a:buClr>
+              <a:buSzPct val="100000"/>
+              <a:buFont typeface="Arial"/>
+              <a:buChar char="•"/>
+              <a:defRPr sz="1600" kern="1200" cap="small">
+                <a:gradFill flip="none" rotWithShape="1">
+                  <a:gsLst>
+                    <a:gs pos="0">
+                      <a:schemeClr val="tx1"/>
+                    </a:gs>
+                    <a:gs pos="100000">
+                      <a:schemeClr val="tx1">
+                        <a:lumMod val="75000"/>
+                      </a:schemeClr>
+                    </a:gs>
+                  </a:gsLst>
+                  <a:lin ang="5580000" scaled="0"/>
+                  <a:tileRect/>
+                </a:gradFill>
+                <a:effectLst>
+                  <a:glow rad="38100">
+                    <a:schemeClr val="bg1">
+                      <a:lumMod val="50000"/>
+                      <a:lumOff val="50000"/>
+                      <a:alpha val="20000"/>
+                    </a:schemeClr>
+                  </a:glow>
+                  <a:outerShdw blurRad="44450" dist="12700" dir="13860000" algn="tl" rotWithShape="0">
+                    <a:srgbClr val="000000">
+                      <a:alpha val="20000"/>
+                    </a:srgbClr>
+                  </a:outerShdw>
+                </a:effectLst>
+                <a:latin typeface="+mn-lt"/>
+                <a:ea typeface="+mn-ea"/>
+                <a:cs typeface="+mn-cs"/>
+              </a:defRPr>
+            </a:lvl3pPr>
+            <a:lvl4pPr marL="1543050" indent="-171450" algn="l" defTabSz="457200" rtl="0" eaLnBrk="1" latinLnBrk="0" hangingPunct="1">
+              <a:spcBef>
+                <a:spcPct val="20000"/>
+              </a:spcBef>
+              <a:spcAft>
+                <a:spcPts val="600"/>
+              </a:spcAft>
+              <a:buClr>
+                <a:schemeClr val="tx1"/>
+              </a:buClr>
+              <a:buSzPct val="100000"/>
+              <a:buFont typeface="Arial"/>
+              <a:buChar char="•"/>
+              <a:defRPr sz="1400" kern="1200" cap="small">
+                <a:gradFill flip="none" rotWithShape="1">
+                  <a:gsLst>
+                    <a:gs pos="0">
+                      <a:schemeClr val="tx1"/>
+                    </a:gs>
+                    <a:gs pos="100000">
+                      <a:schemeClr val="tx1">
+                        <a:lumMod val="75000"/>
+                      </a:schemeClr>
+                    </a:gs>
+                  </a:gsLst>
+                  <a:lin ang="5580000" scaled="0"/>
+                  <a:tileRect/>
+                </a:gradFill>
+                <a:effectLst>
+                  <a:glow rad="38100">
+                    <a:schemeClr val="bg1">
+                      <a:lumMod val="50000"/>
+                      <a:lumOff val="50000"/>
+                      <a:alpha val="20000"/>
+                    </a:schemeClr>
+                  </a:glow>
+                  <a:outerShdw blurRad="44450" dist="12700" dir="13860000" algn="tl" rotWithShape="0">
+                    <a:srgbClr val="000000">
+                      <a:alpha val="20000"/>
+                    </a:srgbClr>
+                  </a:outerShdw>
+                </a:effectLst>
+                <a:latin typeface="+mn-lt"/>
+                <a:ea typeface="+mn-ea"/>
+                <a:cs typeface="+mn-cs"/>
+              </a:defRPr>
+            </a:lvl4pPr>
+            <a:lvl5pPr marL="2000250" indent="-171450" algn="l" defTabSz="457200" rtl="0" eaLnBrk="1" latinLnBrk="0" hangingPunct="1">
+              <a:spcBef>
+                <a:spcPct val="20000"/>
+              </a:spcBef>
+              <a:spcAft>
+                <a:spcPts val="600"/>
+              </a:spcAft>
+              <a:buClr>
+                <a:schemeClr val="tx1"/>
+              </a:buClr>
+              <a:buSzPct val="100000"/>
+              <a:buFont typeface="Arial"/>
+              <a:buChar char="•"/>
+              <a:defRPr sz="1400" kern="1200" cap="small">
+                <a:gradFill flip="none" rotWithShape="1">
+                  <a:gsLst>
+                    <a:gs pos="0">
+                      <a:schemeClr val="tx1"/>
+                    </a:gs>
+                    <a:gs pos="100000">
+                      <a:schemeClr val="tx1">
+                        <a:lumMod val="75000"/>
+                      </a:schemeClr>
+                    </a:gs>
+                  </a:gsLst>
+                  <a:lin ang="5580000" scaled="0"/>
+                  <a:tileRect/>
+                </a:gradFill>
+                <a:effectLst>
+                  <a:glow rad="38100">
+                    <a:schemeClr val="bg1">
+                      <a:lumMod val="50000"/>
+                      <a:lumOff val="50000"/>
+                      <a:alpha val="20000"/>
+                    </a:schemeClr>
+                  </a:glow>
+                  <a:outerShdw blurRad="44450" dist="12700" dir="13860000" algn="tl" rotWithShape="0">
+                    <a:srgbClr val="000000">
+                      <a:alpha val="20000"/>
+                    </a:srgbClr>
+                  </a:outerShdw>
+                </a:effectLst>
+                <a:latin typeface="+mn-lt"/>
+                <a:ea typeface="+mn-ea"/>
+                <a:cs typeface="+mn-cs"/>
+              </a:defRPr>
+            </a:lvl5pPr>
+            <a:lvl6pPr marL="2514600" indent="-228600" algn="l" defTabSz="457200" rtl="0" eaLnBrk="1" latinLnBrk="0" hangingPunct="1">
+              <a:spcBef>
+                <a:spcPct val="20000"/>
+              </a:spcBef>
+              <a:spcAft>
+                <a:spcPts val="600"/>
+              </a:spcAft>
+              <a:buClr>
+                <a:schemeClr val="tx1"/>
+              </a:buClr>
+              <a:buSzPct val="100000"/>
+              <a:buFont typeface="Arial"/>
+              <a:buChar char="•"/>
+              <a:defRPr sz="1200" kern="1200" cap="small">
+                <a:gradFill flip="none" rotWithShape="1">
+                  <a:gsLst>
+                    <a:gs pos="0">
+                      <a:schemeClr val="tx1"/>
+                    </a:gs>
+                    <a:gs pos="100000">
+                      <a:schemeClr val="tx1">
+                        <a:lumMod val="75000"/>
+                      </a:schemeClr>
+                    </a:gs>
+                  </a:gsLst>
+                  <a:lin ang="5580000" scaled="0"/>
+                  <a:tileRect/>
+                </a:gradFill>
+                <a:effectLst>
+                  <a:glow rad="38100">
+                    <a:schemeClr val="bg1">
+                      <a:lumMod val="50000"/>
+                      <a:lumOff val="50000"/>
+                      <a:alpha val="20000"/>
+                    </a:schemeClr>
+                  </a:glow>
+                  <a:outerShdw blurRad="44450" dist="12700" dir="13860000" algn="tl" rotWithShape="0">
+                    <a:srgbClr val="000000">
+                      <a:alpha val="20000"/>
+                    </a:srgbClr>
+                  </a:outerShdw>
+                </a:effectLst>
+                <a:latin typeface="+mn-lt"/>
+                <a:ea typeface="+mn-ea"/>
+                <a:cs typeface="+mn-cs"/>
+              </a:defRPr>
+            </a:lvl6pPr>
+            <a:lvl7pPr marL="2971800" indent="-228600" algn="l" defTabSz="457200" rtl="0" eaLnBrk="1" latinLnBrk="0" hangingPunct="1">
+              <a:spcBef>
+                <a:spcPct val="20000"/>
+              </a:spcBef>
+              <a:spcAft>
+                <a:spcPts val="600"/>
+              </a:spcAft>
+              <a:buClr>
+                <a:schemeClr val="tx1"/>
+              </a:buClr>
+              <a:buSzPct val="100000"/>
+              <a:buFont typeface="Arial"/>
+              <a:buChar char="•"/>
+              <a:defRPr sz="1200" kern="1200" cap="small">
+                <a:gradFill flip="none" rotWithShape="1">
+                  <a:gsLst>
+                    <a:gs pos="0">
+                      <a:schemeClr val="tx1"/>
+                    </a:gs>
+                    <a:gs pos="100000">
+                      <a:schemeClr val="tx1">
+                        <a:lumMod val="75000"/>
+                      </a:schemeClr>
+                    </a:gs>
+                  </a:gsLst>
+                  <a:lin ang="5580000" scaled="0"/>
+                  <a:tileRect/>
+                </a:gradFill>
+                <a:effectLst>
+                  <a:glow rad="38100">
+                    <a:schemeClr val="bg1">
+                      <a:lumMod val="50000"/>
+                      <a:lumOff val="50000"/>
+                      <a:alpha val="20000"/>
+                    </a:schemeClr>
+                  </a:glow>
+                  <a:outerShdw blurRad="44450" dist="12700" dir="13860000" algn="tl" rotWithShape="0">
+                    <a:srgbClr val="000000">
+                      <a:alpha val="20000"/>
+                    </a:srgbClr>
+                  </a:outerShdw>
+                </a:effectLst>
+                <a:latin typeface="+mn-lt"/>
+                <a:ea typeface="+mn-ea"/>
+                <a:cs typeface="+mn-cs"/>
+              </a:defRPr>
+            </a:lvl7pPr>
+            <a:lvl8pPr marL="3429000" indent="-228600" algn="l" defTabSz="457200" rtl="0" eaLnBrk="1" latinLnBrk="0" hangingPunct="1">
+              <a:spcBef>
+                <a:spcPct val="20000"/>
+              </a:spcBef>
+              <a:spcAft>
+                <a:spcPts val="600"/>
+              </a:spcAft>
+              <a:buClr>
+                <a:schemeClr val="tx1"/>
+              </a:buClr>
+              <a:buSzPct val="100000"/>
+              <a:buFont typeface="Arial"/>
+              <a:buChar char="•"/>
+              <a:defRPr sz="1200" kern="1200" cap="small">
+                <a:gradFill flip="none" rotWithShape="1">
+                  <a:gsLst>
+                    <a:gs pos="0">
+                      <a:schemeClr val="tx1"/>
+                    </a:gs>
+                    <a:gs pos="100000">
+                      <a:schemeClr val="tx1">
+                        <a:lumMod val="75000"/>
+                      </a:schemeClr>
+                    </a:gs>
+                  </a:gsLst>
+                  <a:lin ang="5580000" scaled="0"/>
+                  <a:tileRect/>
+                </a:gradFill>
+                <a:effectLst>
+                  <a:glow rad="38100">
+                    <a:schemeClr val="bg1">
+                      <a:lumMod val="50000"/>
+                      <a:lumOff val="50000"/>
+                      <a:alpha val="20000"/>
+                    </a:schemeClr>
+                  </a:glow>
+                  <a:outerShdw blurRad="44450" dist="12700" dir="13860000" algn="tl" rotWithShape="0">
+                    <a:srgbClr val="000000">
+                      <a:alpha val="20000"/>
+                    </a:srgbClr>
+                  </a:outerShdw>
+                </a:effectLst>
+                <a:latin typeface="+mn-lt"/>
+                <a:ea typeface="+mn-ea"/>
+                <a:cs typeface="+mn-cs"/>
+              </a:defRPr>
+            </a:lvl8pPr>
+            <a:lvl9pPr marL="3886200" indent="-228600" algn="l" defTabSz="457200" rtl="0" eaLnBrk="1" latinLnBrk="0" hangingPunct="1">
+              <a:spcBef>
+                <a:spcPct val="20000"/>
+              </a:spcBef>
+              <a:spcAft>
+                <a:spcPts val="600"/>
+              </a:spcAft>
+              <a:buClr>
+                <a:schemeClr val="tx1"/>
+              </a:buClr>
+              <a:buSzPct val="100000"/>
+              <a:buFont typeface="Arial"/>
+              <a:buChar char="•"/>
+              <a:defRPr sz="1200" kern="1200" cap="small">
+                <a:gradFill flip="none" rotWithShape="1">
+                  <a:gsLst>
+                    <a:gs pos="0">
+                      <a:schemeClr val="tx1"/>
+                    </a:gs>
+                    <a:gs pos="100000">
+                      <a:schemeClr val="tx1">
+                        <a:lumMod val="75000"/>
+                      </a:schemeClr>
+                    </a:gs>
+                  </a:gsLst>
+                  <a:lin ang="5580000" scaled="0"/>
+                  <a:tileRect/>
+                </a:gradFill>
+                <a:effectLst>
+                  <a:glow rad="38100">
+                    <a:schemeClr val="bg1">
+                      <a:lumMod val="50000"/>
+                      <a:lumOff val="50000"/>
+                      <a:alpha val="20000"/>
+                    </a:schemeClr>
+                  </a:glow>
+                  <a:outerShdw blurRad="44450" dist="12700" dir="13860000" algn="tl" rotWithShape="0">
+                    <a:srgbClr val="000000">
+                      <a:alpha val="20000"/>
+                    </a:srgbClr>
+                  </a:outerShdw>
+                </a:effectLst>
+                <a:latin typeface="+mn-lt"/>
+                <a:ea typeface="+mn-ea"/>
+                <a:cs typeface="+mn-cs"/>
+              </a:defRPr>
+            </a:lvl9pPr>
+          </a:lstStyle>
+          <a:p>
+            <a:r>
+              <a:rPr lang="pt-BR" dirty="0">
+                <a:gradFill flip="none">
+                  <a:gsLst>
+                    <a:gs pos="0">
+                      <a:srgbClr val="FFFFFF"/>
+                    </a:gs>
+                    <a:gs pos="100000">
+                      <a:srgbClr val="FFFFFF"/>
+                    </a:gs>
+                  </a:gsLst>
+                  <a:lin ang="5580000" scaled="0"/>
+                  <a:tileRect/>
+                </a:gradFill>
+                <a:effectLst>
+                  <a:glow rad="38100">
+                    <a:prstClr val="black">
+                      <a:lumMod val="50000"/>
+                      <a:lumOff val="50000"/>
+                      <a:alpha val="20000"/>
+                    </a:prstClr>
+                  </a:glow>
+                  <a:outerShdw blurRad="44450" dist="12700" dir="13860000" algn="tl" rotWithShape="0">
+                    <a:srgbClr val="000000">
+                      <a:alpha val="20000"/>
+                    </a:srgbClr>
+                  </a:outerShdw>
+                </a:effectLst>
+              </a:rPr>
+              <a:t>Curto prazo;</a:t>
+            </a:r>
+          </a:p>
+          <a:p>
+            <a:pPr>
+              <a:buClr>
+                <a:srgbClr val="FFFFFF"/>
+              </a:buClr>
+            </a:pPr>
+            <a:r>
+              <a:rPr lang="pt-BR" dirty="0">
+                <a:gradFill flip="none">
+                  <a:gsLst>
+                    <a:gs pos="0">
+                      <a:srgbClr val="FFFFFF"/>
+                    </a:gs>
+                    <a:gs pos="100000">
+                      <a:srgbClr val="FFFFFF"/>
+                    </a:gs>
+                  </a:gsLst>
+                  <a:lin ang="5580000" scaled="0"/>
+                  <a:tileRect/>
+                </a:gradFill>
+                <a:effectLst>
+                  <a:glow rad="38100">
+                    <a:prstClr val="black">
+                      <a:lumMod val="50000"/>
+                      <a:lumOff val="50000"/>
+                      <a:alpha val="20000"/>
+                    </a:prstClr>
+                  </a:glow>
+                  <a:outerShdw blurRad="44450" dist="12700" dir="13860000" algn="tl" rotWithShape="0">
+                    <a:srgbClr val="000000">
+                      <a:alpha val="20000"/>
+                    </a:srgbClr>
+                  </a:outerShdw>
+                </a:effectLst>
+              </a:rPr>
+              <a:t>Definições de escopo;</a:t>
+            </a:r>
+          </a:p>
+          <a:p>
+            <a:pPr>
+              <a:buClr>
+                <a:srgbClr val="FFFFFF"/>
+              </a:buClr>
+            </a:pPr>
+            <a:r>
+              <a:rPr lang="pt-BR" dirty="0">
+                <a:gradFill flip="none">
+                  <a:gsLst>
+                    <a:gs pos="0">
+                      <a:srgbClr val="FFFFFF"/>
+                    </a:gs>
+                    <a:gs pos="100000">
+                      <a:srgbClr val="FFFFFF"/>
+                    </a:gs>
+                  </a:gsLst>
+                  <a:lin ang="5580000" scaled="0"/>
+                  <a:tileRect/>
+                </a:gradFill>
+                <a:effectLst>
+                  <a:glow rad="38100">
+                    <a:prstClr val="black">
+                      <a:lumMod val="50000"/>
+                      <a:lumOff val="50000"/>
+                      <a:alpha val="20000"/>
+                    </a:prstClr>
+                  </a:glow>
+                  <a:outerShdw blurRad="44450" dist="12700" dir="13860000" algn="tl" rotWithShape="0">
+                    <a:srgbClr val="000000">
+                      <a:alpha val="20000"/>
+                    </a:srgbClr>
+                  </a:outerShdw>
+                </a:effectLst>
+              </a:rPr>
+              <a:t>Muitas ideias para pouca ação.</a:t>
             </a:r>
           </a:p>
         </p:txBody>
@@ -6836,13 +9316,288 @@
     </p:spTree>
     <p:extLst>
       <p:ext uri="{BB962C8B-B14F-4D97-AF65-F5344CB8AC3E}">
-        <p14:creationId xmlns:p14="http://schemas.microsoft.com/office/powerpoint/2010/main" val="4002625472"/>
+        <p14:creationId xmlns:p14="http://schemas.microsoft.com/office/powerpoint/2010/main" val="4114693472"/>
       </p:ext>
     </p:extLst>
   </p:cSld>
   <p:clrMapOvr>
     <a:masterClrMapping/>
   </p:clrMapOvr>
+  <p:timing>
+    <p:tnLst>
+      <p:par>
+        <p:cTn id="1" dur="indefinite" restart="never" nodeType="tmRoot">
+          <p:childTnLst>
+            <p:seq concurrent="1" nextAc="seek">
+              <p:cTn id="2" dur="indefinite" nodeType="mainSeq">
+                <p:childTnLst>
+                  <p:par>
+                    <p:cTn id="3" fill="hold">
+                      <p:stCondLst>
+                        <p:cond delay="indefinite"/>
+                      </p:stCondLst>
+                      <p:childTnLst>
+                        <p:par>
+                          <p:cTn id="4" fill="hold">
+                            <p:stCondLst>
+                              <p:cond delay="0"/>
+                            </p:stCondLst>
+                            <p:childTnLst>
+                              <p:par>
+                                <p:cTn id="5" presetID="1" presetClass="entr" presetSubtype="0" fill="hold" grpId="0" nodeType="clickEffect">
+                                  <p:stCondLst>
+                                    <p:cond delay="0"/>
+                                  </p:stCondLst>
+                                  <p:childTnLst>
+                                    <p:set>
+                                      <p:cBhvr>
+                                        <p:cTn id="6" dur="1" fill="hold">
+                                          <p:stCondLst>
+                                            <p:cond delay="0"/>
+                                          </p:stCondLst>
+                                        </p:cTn>
+                                        <p:tgtEl>
+                                          <p:spTgt spid="3">
+                                            <p:txEl>
+                                              <p:pRg st="0" end="0"/>
+                                            </p:txEl>
+                                          </p:spTgt>
+                                        </p:tgtEl>
+                                        <p:attrNameLst>
+                                          <p:attrName>style.visibility</p:attrName>
+                                        </p:attrNameLst>
+                                      </p:cBhvr>
+                                      <p:to>
+                                        <p:strVal val="visible"/>
+                                      </p:to>
+                                    </p:set>
+                                  </p:childTnLst>
+                                </p:cTn>
+                              </p:par>
+                            </p:childTnLst>
+                          </p:cTn>
+                        </p:par>
+                      </p:childTnLst>
+                    </p:cTn>
+                  </p:par>
+                  <p:par>
+                    <p:cTn id="7" fill="hold">
+                      <p:stCondLst>
+                        <p:cond delay="indefinite"/>
+                      </p:stCondLst>
+                      <p:childTnLst>
+                        <p:par>
+                          <p:cTn id="8" fill="hold">
+                            <p:stCondLst>
+                              <p:cond delay="0"/>
+                            </p:stCondLst>
+                            <p:childTnLst>
+                              <p:par>
+                                <p:cTn id="9" presetID="1" presetClass="entr" presetSubtype="0" fill="hold" grpId="0" nodeType="clickEffect">
+                                  <p:stCondLst>
+                                    <p:cond delay="0"/>
+                                  </p:stCondLst>
+                                  <p:childTnLst>
+                                    <p:set>
+                                      <p:cBhvr>
+                                        <p:cTn id="10" dur="1" fill="hold">
+                                          <p:stCondLst>
+                                            <p:cond delay="0"/>
+                                          </p:stCondLst>
+                                        </p:cTn>
+                                        <p:tgtEl>
+                                          <p:spTgt spid="3">
+                                            <p:txEl>
+                                              <p:pRg st="1" end="1"/>
+                                            </p:txEl>
+                                          </p:spTgt>
+                                        </p:tgtEl>
+                                        <p:attrNameLst>
+                                          <p:attrName>style.visibility</p:attrName>
+                                        </p:attrNameLst>
+                                      </p:cBhvr>
+                                      <p:to>
+                                        <p:strVal val="visible"/>
+                                      </p:to>
+                                    </p:set>
+                                  </p:childTnLst>
+                                </p:cTn>
+                              </p:par>
+                            </p:childTnLst>
+                          </p:cTn>
+                        </p:par>
+                      </p:childTnLst>
+                    </p:cTn>
+                  </p:par>
+                  <p:par>
+                    <p:cTn id="11" fill="hold">
+                      <p:stCondLst>
+                        <p:cond delay="indefinite"/>
+                      </p:stCondLst>
+                      <p:childTnLst>
+                        <p:par>
+                          <p:cTn id="12" fill="hold">
+                            <p:stCondLst>
+                              <p:cond delay="0"/>
+                            </p:stCondLst>
+                            <p:childTnLst>
+                              <p:par>
+                                <p:cTn id="13" presetID="1" presetClass="entr" presetSubtype="0" fill="hold" grpId="0" nodeType="clickEffect">
+                                  <p:stCondLst>
+                                    <p:cond delay="0"/>
+                                  </p:stCondLst>
+                                  <p:childTnLst>
+                                    <p:set>
+                                      <p:cBhvr>
+                                        <p:cTn id="14" dur="1" fill="hold">
+                                          <p:stCondLst>
+                                            <p:cond delay="0"/>
+                                          </p:stCondLst>
+                                        </p:cTn>
+                                        <p:tgtEl>
+                                          <p:spTgt spid="3">
+                                            <p:txEl>
+                                              <p:pRg st="2" end="2"/>
+                                            </p:txEl>
+                                          </p:spTgt>
+                                        </p:tgtEl>
+                                        <p:attrNameLst>
+                                          <p:attrName>style.visibility</p:attrName>
+                                        </p:attrNameLst>
+                                      </p:cBhvr>
+                                      <p:to>
+                                        <p:strVal val="visible"/>
+                                      </p:to>
+                                    </p:set>
+                                  </p:childTnLst>
+                                </p:cTn>
+                              </p:par>
+                            </p:childTnLst>
+                          </p:cTn>
+                        </p:par>
+                      </p:childTnLst>
+                    </p:cTn>
+                  </p:par>
+                  <p:par>
+                    <p:cTn id="15" fill="hold">
+                      <p:stCondLst>
+                        <p:cond delay="indefinite"/>
+                      </p:stCondLst>
+                      <p:childTnLst>
+                        <p:par>
+                          <p:cTn id="16" fill="hold">
+                            <p:stCondLst>
+                              <p:cond delay="0"/>
+                            </p:stCondLst>
+                            <p:childTnLst>
+                              <p:par>
+                                <p:cTn id="17" presetID="1" presetClass="entr" presetSubtype="0" fill="hold" grpId="0" nodeType="clickEffect">
+                                  <p:stCondLst>
+                                    <p:cond delay="0"/>
+                                  </p:stCondLst>
+                                  <p:childTnLst>
+                                    <p:set>
+                                      <p:cBhvr>
+                                        <p:cTn id="18" dur="1" fill="hold">
+                                          <p:stCondLst>
+                                            <p:cond delay="0"/>
+                                          </p:stCondLst>
+                                        </p:cTn>
+                                        <p:tgtEl>
+                                          <p:spTgt spid="3">
+                                            <p:txEl>
+                                              <p:pRg st="3" end="3"/>
+                                            </p:txEl>
+                                          </p:spTgt>
+                                        </p:tgtEl>
+                                        <p:attrNameLst>
+                                          <p:attrName>style.visibility</p:attrName>
+                                        </p:attrNameLst>
+                                      </p:cBhvr>
+                                      <p:to>
+                                        <p:strVal val="visible"/>
+                                      </p:to>
+                                    </p:set>
+                                  </p:childTnLst>
+                                </p:cTn>
+                              </p:par>
+                            </p:childTnLst>
+                          </p:cTn>
+                        </p:par>
+                      </p:childTnLst>
+                    </p:cTn>
+                  </p:par>
+                  <p:par>
+                    <p:cTn id="19" fill="hold">
+                      <p:stCondLst>
+                        <p:cond delay="indefinite"/>
+                      </p:stCondLst>
+                      <p:childTnLst>
+                        <p:par>
+                          <p:cTn id="20" fill="hold">
+                            <p:stCondLst>
+                              <p:cond delay="0"/>
+                            </p:stCondLst>
+                            <p:childTnLst>
+                              <p:par>
+                                <p:cTn id="21" presetID="1" presetClass="entr" presetSubtype="0" fill="hold" grpId="0" nodeType="clickEffect">
+                                  <p:stCondLst>
+                                    <p:cond delay="0"/>
+                                  </p:stCondLst>
+                                  <p:childTnLst>
+                                    <p:set>
+                                      <p:cBhvr>
+                                        <p:cTn id="22" dur="1" fill="hold">
+                                          <p:stCondLst>
+                                            <p:cond delay="0"/>
+                                          </p:stCondLst>
+                                        </p:cTn>
+                                        <p:tgtEl>
+                                          <p:spTgt spid="7"/>
+                                        </p:tgtEl>
+                                        <p:attrNameLst>
+                                          <p:attrName>style.visibility</p:attrName>
+                                        </p:attrNameLst>
+                                      </p:cBhvr>
+                                      <p:to>
+                                        <p:strVal val="visible"/>
+                                      </p:to>
+                                    </p:set>
+                                  </p:childTnLst>
+                                </p:cTn>
+                              </p:par>
+                            </p:childTnLst>
+                          </p:cTn>
+                        </p:par>
+                      </p:childTnLst>
+                    </p:cTn>
+                  </p:par>
+                </p:childTnLst>
+              </p:cTn>
+              <p:prevCondLst>
+                <p:cond evt="onPrev" delay="0">
+                  <p:tgtEl>
+                    <p:sldTgt/>
+                  </p:tgtEl>
+                </p:cond>
+              </p:prevCondLst>
+              <p:nextCondLst>
+                <p:cond evt="onNext" delay="0">
+                  <p:tgtEl>
+                    <p:sldTgt/>
+                  </p:tgtEl>
+                </p:cond>
+              </p:nextCondLst>
+            </p:seq>
+          </p:childTnLst>
+        </p:cTn>
+      </p:par>
+    </p:tnLst>
+    <p:bldLst>
+      <p:bldP spid="3" grpId="0" build="p"/>
+      <p:bldP spid="7" grpId="0"/>
+    </p:bldLst>
+  </p:timing>
 </p:sld>
 </file>
 
@@ -7059,6 +9814,900 @@
   <p:clrMapOvr>
     <a:masterClrMapping/>
   </p:clrMapOvr>
+  <mc:AlternateContent xmlns:mc="http://schemas.openxmlformats.org/markup-compatibility/2006">
+    <mc:Choice xmlns:p14="http://schemas.microsoft.com/office/powerpoint/2010/main" Requires="p14">
+      <p:transition spd="med" p14:dur="700">
+        <p:fade/>
+      </p:transition>
+    </mc:Choice>
+    <mc:Fallback>
+      <p:transition spd="med">
+        <p:fade/>
+      </p:transition>
+    </mc:Fallback>
+  </mc:AlternateContent>
+</p:sld>
+</file>
+
+<file path=ppt/slides/slide6.xml><?xml version="1.0" encoding="utf-8"?>
+<p:sld xmlns:a="http://schemas.openxmlformats.org/drawingml/2006/main" xmlns:r="http://schemas.openxmlformats.org/officeDocument/2006/relationships" xmlns:p="http://schemas.openxmlformats.org/presentationml/2006/main">
+  <p:cSld>
+    <p:spTree>
+      <p:nvGrpSpPr>
+        <p:cNvPr id="1" name=""/>
+        <p:cNvGrpSpPr/>
+        <p:nvPr/>
+      </p:nvGrpSpPr>
+      <p:grpSpPr>
+        <a:xfrm>
+          <a:off x="0" y="0"/>
+          <a:ext cx="0" cy="0"/>
+          <a:chOff x="0" y="0"/>
+          <a:chExt cx="0" cy="0"/>
+        </a:xfrm>
+      </p:grpSpPr>
+      <p:sp>
+        <p:nvSpPr>
+          <p:cNvPr id="2" name="Title 1">
+            <a:extLst>
+              <a:ext uri="{FF2B5EF4-FFF2-40B4-BE49-F238E27FC236}">
+                <a16:creationId xmlns:a16="http://schemas.microsoft.com/office/drawing/2014/main" id="{6F03E8D2-045A-AE30-A9E2-A9C17769F076}"/>
+              </a:ext>
+            </a:extLst>
+          </p:cNvPr>
+          <p:cNvSpPr>
+            <a:spLocks noGrp="1"/>
+          </p:cNvSpPr>
+          <p:nvPr>
+            <p:ph type="title"/>
+          </p:nvPr>
+        </p:nvSpPr>
+        <p:spPr>
+          <a:xfrm>
+            <a:off x="1141413" y="278921"/>
+            <a:ext cx="9905998" cy="1905000"/>
+          </a:xfrm>
+        </p:spPr>
+        <p:txBody>
+          <a:bodyPr/>
+          <a:lstStyle/>
+          <a:p>
+            <a:pPr algn="ctr"/>
+            <a:r>
+              <a:rPr lang="pt-BR" dirty="0">
+                <a:gradFill flip="none">
+                  <a:gsLst>
+                    <a:gs pos="0">
+                      <a:srgbClr val="FFFFFF"/>
+                    </a:gs>
+                    <a:gs pos="100000">
+                      <a:srgbClr val="FFFFFF"/>
+                    </a:gs>
+                  </a:gsLst>
+                  <a:lin ang="5580000" scaled="0"/>
+                  <a:tileRect/>
+                </a:gradFill>
+              </a:rPr>
+              <a:t>Vamos ao site!</a:t>
+            </a:r>
+            <a:endParaRPr lang="pt-BR" dirty="0"/>
+          </a:p>
+        </p:txBody>
+      </p:sp>
+      <p:pic>
+        <p:nvPicPr>
+          <p:cNvPr id="4" name="Content Placeholder 3" descr="Tela de computador com imagem de jogo de vídeo game&#10;&#10;O conteúdo gerado por IA pode estar incorreto.">
+            <a:extLst>
+              <a:ext uri="{FF2B5EF4-FFF2-40B4-BE49-F238E27FC236}">
+                <a16:creationId xmlns:a16="http://schemas.microsoft.com/office/drawing/2014/main" id="{6CF19A30-4277-A1BA-F73D-D409B1152ED7}"/>
+              </a:ext>
+            </a:extLst>
+          </p:cNvPr>
+          <p:cNvPicPr>
+            <a:picLocks noGrp="1" noChangeAspect="1"/>
+          </p:cNvPicPr>
+          <p:nvPr>
+            <p:ph idx="1"/>
+          </p:nvPr>
+        </p:nvPicPr>
+        <p:blipFill>
+          <a:blip r:embed="rId2"/>
+          <a:stretch>
+            <a:fillRect/>
+          </a:stretch>
+        </p:blipFill>
+        <p:spPr>
+          <a:xfrm>
+            <a:off x="1763417" y="2192546"/>
+            <a:ext cx="8661989" cy="3498012"/>
+          </a:xfrm>
+          <a:prstGeom prst="rect">
+            <a:avLst/>
+          </a:prstGeom>
+          <a:ln>
+            <a:noFill/>
+          </a:ln>
+          <a:effectLst>
+            <a:softEdge rad="112500"/>
+          </a:effectLst>
+        </p:spPr>
+      </p:pic>
+    </p:spTree>
+    <p:extLst>
+      <p:ext uri="{BB962C8B-B14F-4D97-AF65-F5344CB8AC3E}">
+        <p14:creationId xmlns:p14="http://schemas.microsoft.com/office/powerpoint/2010/main" val="3059816306"/>
+      </p:ext>
+    </p:extLst>
+  </p:cSld>
+  <p:clrMapOvr>
+    <a:masterClrMapping/>
+  </p:clrMapOvr>
+  <mc:AlternateContent xmlns:mc="http://schemas.openxmlformats.org/markup-compatibility/2006">
+    <mc:Choice xmlns:p14="http://schemas.microsoft.com/office/powerpoint/2010/main" Requires="p14">
+      <p:transition spd="med" p14:dur="700">
+        <p:fade/>
+      </p:transition>
+    </mc:Choice>
+    <mc:Fallback>
+      <p:transition spd="med">
+        <p:fade/>
+      </p:transition>
+    </mc:Fallback>
+  </mc:AlternateContent>
+</p:sld>
+</file>
+
+<file path=ppt/slides/slide7.xml><?xml version="1.0" encoding="utf-8"?>
+<p:sld xmlns:a="http://schemas.openxmlformats.org/drawingml/2006/main" xmlns:r="http://schemas.openxmlformats.org/officeDocument/2006/relationships" xmlns:p="http://schemas.openxmlformats.org/presentationml/2006/main">
+  <p:cSld>
+    <p:spTree>
+      <p:nvGrpSpPr>
+        <p:cNvPr id="1" name=""/>
+        <p:cNvGrpSpPr/>
+        <p:nvPr/>
+      </p:nvGrpSpPr>
+      <p:grpSpPr>
+        <a:xfrm>
+          <a:off x="0" y="0"/>
+          <a:ext cx="0" cy="0"/>
+          <a:chOff x="0" y="0"/>
+          <a:chExt cx="0" cy="0"/>
+        </a:xfrm>
+      </p:grpSpPr>
+      <p:sp>
+        <p:nvSpPr>
+          <p:cNvPr id="2" name="Title 1">
+            <a:extLst>
+              <a:ext uri="{FF2B5EF4-FFF2-40B4-BE49-F238E27FC236}">
+                <a16:creationId xmlns:a16="http://schemas.microsoft.com/office/drawing/2014/main" id="{11D92640-5418-2029-AF71-01F2B3F297A4}"/>
+              </a:ext>
+            </a:extLst>
+          </p:cNvPr>
+          <p:cNvSpPr>
+            <a:spLocks noGrp="1"/>
+          </p:cNvSpPr>
+          <p:nvPr>
+            <p:ph type="title"/>
+          </p:nvPr>
+        </p:nvSpPr>
+        <p:spPr/>
+        <p:txBody>
+          <a:bodyPr/>
+          <a:lstStyle/>
+          <a:p>
+            <a:pPr algn="ctr"/>
+            <a:r>
+              <a:rPr lang="pt-BR">
+                <a:gradFill flip="none">
+                  <a:gsLst>
+                    <a:gs pos="0">
+                      <a:srgbClr val="FFFFFF"/>
+                    </a:gs>
+                    <a:gs pos="100000">
+                      <a:srgbClr val="FFFFFF"/>
+                    </a:gs>
+                  </a:gsLst>
+                  <a:lin ang="5580000" scaled="0"/>
+                  <a:tileRect/>
+                </a:gradFill>
+                <a:effectLst>
+                  <a:glow rad="38100">
+                    <a:prstClr val="black">
+                      <a:lumMod val="65000"/>
+                      <a:lumOff val="35000"/>
+                      <a:alpha val="40000"/>
+                    </a:prstClr>
+                  </a:glow>
+                  <a:outerShdw blurRad="28575" dist="38100" dir="14040000" algn="tl" rotWithShape="0">
+                    <a:srgbClr val="000000">
+                      <a:alpha val="25000"/>
+                    </a:srgbClr>
+                  </a:outerShdw>
+                </a:effectLst>
+              </a:rPr>
+              <a:t>AGRADECIMENTOS</a:t>
+            </a:r>
+            <a:endParaRPr lang="pt-BR">
+              <a:gradFill flip="none" rotWithShape="1">
+                <a:gsLst>
+                  <a:gs pos="0">
+                    <a:prstClr val="white"/>
+                  </a:gs>
+                  <a:gs pos="100000">
+                    <a:prstClr val="white">
+                      <a:lumMod val="65000"/>
+                    </a:prstClr>
+                  </a:gs>
+                </a:gsLst>
+                <a:lin ang="5580000" scaled="0"/>
+                <a:tileRect/>
+              </a:gradFill>
+              <a:effectLst>
+                <a:glow rad="38100">
+                  <a:prstClr val="black">
+                    <a:lumMod val="65000"/>
+                    <a:lumOff val="35000"/>
+                    <a:alpha val="40000"/>
+                  </a:prstClr>
+                </a:glow>
+                <a:outerShdw blurRad="28575" dist="38100" dir="14040000" algn="tl" rotWithShape="0">
+                  <a:srgbClr val="000000">
+                    <a:alpha val="25000"/>
+                  </a:srgbClr>
+                </a:outerShdw>
+              </a:effectLst>
+            </a:endParaRPr>
+          </a:p>
+        </p:txBody>
+      </p:sp>
+      <p:sp>
+        <p:nvSpPr>
+          <p:cNvPr id="3" name="Content Placeholder 2">
+            <a:extLst>
+              <a:ext uri="{FF2B5EF4-FFF2-40B4-BE49-F238E27FC236}">
+                <a16:creationId xmlns:a16="http://schemas.microsoft.com/office/drawing/2014/main" id="{1132D742-7612-885C-7166-650B420A3698}"/>
+              </a:ext>
+            </a:extLst>
+          </p:cNvPr>
+          <p:cNvSpPr>
+            <a:spLocks noGrp="1"/>
+          </p:cNvSpPr>
+          <p:nvPr>
+            <p:ph idx="1"/>
+          </p:nvPr>
+        </p:nvSpPr>
+        <p:spPr/>
+        <p:txBody>
+          <a:bodyPr/>
+          <a:lstStyle/>
+          <a:p>
+            <a:r>
+              <a:rPr lang="pt-BR" dirty="0">
+                <a:gradFill flip="none">
+                  <a:gsLst>
+                    <a:gs pos="0">
+                      <a:srgbClr val="FFFFFF"/>
+                    </a:gs>
+                    <a:gs pos="100000">
+                      <a:srgbClr val="FFFFFF"/>
+                    </a:gs>
+                  </a:gsLst>
+                  <a:lin ang="5580000" scaled="0"/>
+                  <a:tileRect/>
+                </a:gradFill>
+                <a:effectLst>
+                  <a:glow rad="38100">
+                    <a:prstClr val="black">
+                      <a:lumMod val="50000"/>
+                      <a:lumOff val="50000"/>
+                      <a:alpha val="20000"/>
+                    </a:prstClr>
+                  </a:glow>
+                  <a:outerShdw blurRad="44450" dist="12700" dir="13860000" algn="tl" rotWithShape="0">
+                    <a:srgbClr val="000000">
+                      <a:alpha val="20000"/>
+                    </a:srgbClr>
+                  </a:outerShdw>
+                </a:effectLst>
+              </a:rPr>
+              <a:t>Professores e Monitores;</a:t>
+            </a:r>
+          </a:p>
+          <a:p>
+            <a:pPr>
+              <a:buClr>
+                <a:srgbClr val="FFFFFF"/>
+              </a:buClr>
+            </a:pPr>
+            <a:r>
+              <a:rPr lang="pt-BR" dirty="0">
+                <a:gradFill flip="none">
+                  <a:gsLst>
+                    <a:gs pos="0">
+                      <a:srgbClr val="FFFFFF"/>
+                    </a:gs>
+                    <a:gs pos="100000">
+                      <a:srgbClr val="FFFFFF"/>
+                    </a:gs>
+                  </a:gsLst>
+                  <a:lin ang="5580000" scaled="0"/>
+                  <a:tileRect/>
+                </a:gradFill>
+                <a:effectLst>
+                  <a:glow rad="38100">
+                    <a:prstClr val="black">
+                      <a:lumMod val="50000"/>
+                      <a:lumOff val="50000"/>
+                      <a:alpha val="20000"/>
+                    </a:prstClr>
+                  </a:glow>
+                  <a:outerShdw blurRad="44450" dist="12700" dir="13860000" algn="tl" rotWithShape="0">
+                    <a:srgbClr val="000000">
+                      <a:alpha val="20000"/>
+                    </a:srgbClr>
+                  </a:outerShdw>
+                </a:effectLst>
+              </a:rPr>
+              <a:t>Time </a:t>
+            </a:r>
+            <a:r>
+              <a:rPr lang="pt-BR" dirty="0" err="1">
+                <a:gradFill flip="none">
+                  <a:gsLst>
+                    <a:gs pos="0">
+                      <a:srgbClr val="FFFFFF"/>
+                    </a:gs>
+                    <a:gs pos="100000">
+                      <a:srgbClr val="FFFFFF"/>
+                    </a:gs>
+                  </a:gsLst>
+                  <a:lin ang="5580000" scaled="0"/>
+                  <a:tileRect/>
+                </a:gradFill>
+                <a:effectLst>
+                  <a:glow rad="38100">
+                    <a:prstClr val="black">
+                      <a:lumMod val="50000"/>
+                      <a:lumOff val="50000"/>
+                      <a:alpha val="20000"/>
+                    </a:prstClr>
+                  </a:glow>
+                  <a:outerShdw blurRad="44450" dist="12700" dir="13860000" algn="tl" rotWithShape="0">
+                    <a:srgbClr val="000000">
+                      <a:alpha val="20000"/>
+                    </a:srgbClr>
+                  </a:outerShdw>
+                </a:effectLst>
+              </a:rPr>
+              <a:t>Socio-Emocional</a:t>
+            </a:r>
+            <a:r>
+              <a:rPr lang="pt-BR" dirty="0">
+                <a:gradFill flip="none">
+                  <a:gsLst>
+                    <a:gs pos="0">
+                      <a:srgbClr val="FFFFFF"/>
+                    </a:gs>
+                    <a:gs pos="100000">
+                      <a:srgbClr val="FFFFFF"/>
+                    </a:gs>
+                  </a:gsLst>
+                  <a:lin ang="5580000" scaled="0"/>
+                  <a:tileRect/>
+                </a:gradFill>
+                <a:effectLst>
+                  <a:glow rad="38100">
+                    <a:prstClr val="black">
+                      <a:lumMod val="50000"/>
+                      <a:lumOff val="50000"/>
+                      <a:alpha val="20000"/>
+                    </a:prstClr>
+                  </a:glow>
+                  <a:outerShdw blurRad="44450" dist="12700" dir="13860000" algn="tl" rotWithShape="0">
+                    <a:srgbClr val="000000">
+                      <a:alpha val="20000"/>
+                    </a:srgbClr>
+                  </a:outerShdw>
+                </a:effectLst>
+              </a:rPr>
+              <a:t>;</a:t>
+            </a:r>
+          </a:p>
+          <a:p>
+            <a:pPr>
+              <a:buClr>
+                <a:srgbClr val="FFFFFF"/>
+              </a:buClr>
+            </a:pPr>
+            <a:r>
+              <a:rPr lang="pt-BR">
+                <a:gradFill flip="none">
+                  <a:gsLst>
+                    <a:gs pos="0">
+                      <a:srgbClr val="FFFFFF"/>
+                    </a:gs>
+                    <a:gs pos="100000">
+                      <a:srgbClr val="FFFFFF"/>
+                    </a:gs>
+                  </a:gsLst>
+                  <a:lin ang="5580000" scaled="0"/>
+                  <a:tileRect/>
+                </a:gradFill>
+                <a:effectLst>
+                  <a:glow rad="38100">
+                    <a:prstClr val="black">
+                      <a:lumMod val="50000"/>
+                      <a:lumOff val="50000"/>
+                      <a:alpha val="20000"/>
+                    </a:prstClr>
+                  </a:glow>
+                  <a:outerShdw blurRad="44450" dist="12700" dir="13860000" algn="tl" rotWithShape="0">
+                    <a:srgbClr val="000000">
+                      <a:alpha val="20000"/>
+                    </a:srgbClr>
+                  </a:outerShdw>
+                </a:effectLst>
+              </a:rPr>
+              <a:t>Colegas de turma;</a:t>
+            </a:r>
+            <a:endParaRPr lang="pt-BR" dirty="0">
+              <a:gradFill flip="none">
+                <a:gsLst>
+                  <a:gs pos="0">
+                    <a:srgbClr val="FFFFFF"/>
+                  </a:gs>
+                  <a:gs pos="100000">
+                    <a:srgbClr val="FFFFFF"/>
+                  </a:gs>
+                </a:gsLst>
+                <a:lin ang="5580000" scaled="0"/>
+                <a:tileRect/>
+              </a:gradFill>
+              <a:effectLst>
+                <a:glow rad="38100">
+                  <a:prstClr val="black">
+                    <a:lumMod val="50000"/>
+                    <a:lumOff val="50000"/>
+                    <a:alpha val="20000"/>
+                  </a:prstClr>
+                </a:glow>
+                <a:outerShdw blurRad="44450" dist="12700" dir="13860000" algn="tl" rotWithShape="0">
+                  <a:srgbClr val="000000">
+                    <a:alpha val="20000"/>
+                  </a:srgbClr>
+                </a:outerShdw>
+              </a:effectLst>
+            </a:endParaRPr>
+          </a:p>
+          <a:p>
+            <a:pPr>
+              <a:buClr>
+                <a:srgbClr val="FFFFFF"/>
+              </a:buClr>
+            </a:pPr>
+            <a:r>
+              <a:rPr lang="pt-BR">
+                <a:gradFill flip="none">
+                  <a:gsLst>
+                    <a:gs pos="0">
+                      <a:srgbClr val="FFFFFF"/>
+                    </a:gs>
+                    <a:gs pos="100000">
+                      <a:srgbClr val="FFFFFF"/>
+                    </a:gs>
+                  </a:gsLst>
+                  <a:lin ang="5580000" scaled="0"/>
+                  <a:tileRect/>
+                </a:gradFill>
+                <a:effectLst>
+                  <a:glow rad="38100">
+                    <a:prstClr val="black">
+                      <a:lumMod val="50000"/>
+                      <a:lumOff val="50000"/>
+                      <a:alpha val="20000"/>
+                    </a:prstClr>
+                  </a:glow>
+                  <a:outerShdw blurRad="44450" dist="12700" dir="13860000" algn="tl" rotWithShape="0">
+                    <a:srgbClr val="000000">
+                      <a:alpha val="20000"/>
+                    </a:srgbClr>
+                  </a:outerShdw>
+                </a:effectLst>
+              </a:rPr>
+              <a:t>Família;</a:t>
+            </a:r>
+            <a:endParaRPr lang="pt-BR" dirty="0">
+              <a:gradFill flip="none">
+                <a:gsLst>
+                  <a:gs pos="0">
+                    <a:srgbClr val="FFFFFF"/>
+                  </a:gs>
+                  <a:gs pos="100000">
+                    <a:srgbClr val="FFFFFF"/>
+                  </a:gs>
+                </a:gsLst>
+                <a:lin ang="5580000" scaled="0"/>
+                <a:tileRect/>
+              </a:gradFill>
+              <a:effectLst>
+                <a:glow rad="38100">
+                  <a:prstClr val="black">
+                    <a:lumMod val="50000"/>
+                    <a:lumOff val="50000"/>
+                    <a:alpha val="20000"/>
+                  </a:prstClr>
+                </a:glow>
+                <a:outerShdw blurRad="44450" dist="12700" dir="13860000" algn="tl" rotWithShape="0">
+                  <a:srgbClr val="000000">
+                    <a:alpha val="20000"/>
+                  </a:srgbClr>
+                </a:outerShdw>
+              </a:effectLst>
+            </a:endParaRPr>
+          </a:p>
+          <a:p>
+            <a:pPr>
+              <a:buClr>
+                <a:srgbClr val="FFFFFF"/>
+              </a:buClr>
+            </a:pPr>
+            <a:r>
+              <a:rPr lang="pt-BR" dirty="0">
+                <a:gradFill flip="none">
+                  <a:gsLst>
+                    <a:gs pos="0">
+                      <a:srgbClr val="FFFFFF"/>
+                    </a:gs>
+                    <a:gs pos="100000">
+                      <a:srgbClr val="FFFFFF"/>
+                    </a:gs>
+                  </a:gsLst>
+                  <a:lin ang="5580000" scaled="0"/>
+                  <a:tileRect/>
+                </a:gradFill>
+                <a:effectLst>
+                  <a:glow rad="38100">
+                    <a:prstClr val="black">
+                      <a:lumMod val="50000"/>
+                      <a:lumOff val="50000"/>
+                      <a:alpha val="20000"/>
+                    </a:prstClr>
+                  </a:glow>
+                  <a:outerShdw blurRad="44450" dist="12700" dir="13860000" algn="tl" rotWithShape="0">
+                    <a:srgbClr val="000000">
+                      <a:alpha val="20000"/>
+                    </a:srgbClr>
+                  </a:outerShdw>
+                </a:effectLst>
+              </a:rPr>
+              <a:t>Ingrid (colega de turma start tech);</a:t>
+            </a:r>
+          </a:p>
+          <a:p>
+            <a:pPr>
+              <a:buClr>
+                <a:srgbClr val="FFFFFF"/>
+              </a:buClr>
+            </a:pPr>
+            <a:endParaRPr lang="pt-BR" dirty="0">
+              <a:gradFill flip="none">
+                <a:gsLst>
+                  <a:gs pos="0">
+                    <a:srgbClr val="FFFFFF"/>
+                  </a:gs>
+                  <a:gs pos="100000">
+                    <a:srgbClr val="FFFFFF"/>
+                  </a:gs>
+                </a:gsLst>
+                <a:lin ang="5580000" scaled="0"/>
+                <a:tileRect/>
+              </a:gradFill>
+              <a:effectLst>
+                <a:glow rad="38100">
+                  <a:prstClr val="black">
+                    <a:lumMod val="50000"/>
+                    <a:lumOff val="50000"/>
+                    <a:alpha val="20000"/>
+                  </a:prstClr>
+                </a:glow>
+                <a:outerShdw blurRad="44450" dist="12700" dir="13860000" algn="tl" rotWithShape="0">
+                  <a:srgbClr val="000000">
+                    <a:alpha val="20000"/>
+                  </a:srgbClr>
+                </a:outerShdw>
+              </a:effectLst>
+            </a:endParaRPr>
+          </a:p>
+        </p:txBody>
+      </p:sp>
+    </p:spTree>
+    <p:extLst>
+      <p:ext uri="{BB962C8B-B14F-4D97-AF65-F5344CB8AC3E}">
+        <p14:creationId xmlns:p14="http://schemas.microsoft.com/office/powerpoint/2010/main" val="3673413055"/>
+      </p:ext>
+    </p:extLst>
+  </p:cSld>
+  <p:clrMapOvr>
+    <a:masterClrMapping/>
+  </p:clrMapOvr>
+  <p:timing>
+    <p:tnLst>
+      <p:par>
+        <p:cTn id="1" dur="indefinite" restart="never" nodeType="tmRoot">
+          <p:childTnLst>
+            <p:seq concurrent="1" nextAc="seek">
+              <p:cTn id="2" dur="indefinite" nodeType="mainSeq">
+                <p:childTnLst>
+                  <p:par>
+                    <p:cTn id="3" fill="hold">
+                      <p:stCondLst>
+                        <p:cond delay="indefinite"/>
+                      </p:stCondLst>
+                      <p:childTnLst>
+                        <p:par>
+                          <p:cTn id="4" fill="hold">
+                            <p:stCondLst>
+                              <p:cond delay="0"/>
+                            </p:stCondLst>
+                            <p:childTnLst>
+                              <p:par>
+                                <p:cTn id="5" presetID="1" presetClass="entr" presetSubtype="0" fill="hold" grpId="0" nodeType="clickEffect">
+                                  <p:stCondLst>
+                                    <p:cond delay="0"/>
+                                  </p:stCondLst>
+                                  <p:childTnLst>
+                                    <p:set>
+                                      <p:cBhvr>
+                                        <p:cTn id="6" dur="1" fill="hold">
+                                          <p:stCondLst>
+                                            <p:cond delay="0"/>
+                                          </p:stCondLst>
+                                        </p:cTn>
+                                        <p:tgtEl>
+                                          <p:spTgt spid="3">
+                                            <p:txEl>
+                                              <p:pRg st="0" end="0"/>
+                                            </p:txEl>
+                                          </p:spTgt>
+                                        </p:tgtEl>
+                                        <p:attrNameLst>
+                                          <p:attrName>style.visibility</p:attrName>
+                                        </p:attrNameLst>
+                                      </p:cBhvr>
+                                      <p:to>
+                                        <p:strVal val="visible"/>
+                                      </p:to>
+                                    </p:set>
+                                  </p:childTnLst>
+                                </p:cTn>
+                              </p:par>
+                            </p:childTnLst>
+                          </p:cTn>
+                        </p:par>
+                      </p:childTnLst>
+                    </p:cTn>
+                  </p:par>
+                  <p:par>
+                    <p:cTn id="7" fill="hold">
+                      <p:stCondLst>
+                        <p:cond delay="indefinite"/>
+                      </p:stCondLst>
+                      <p:childTnLst>
+                        <p:par>
+                          <p:cTn id="8" fill="hold">
+                            <p:stCondLst>
+                              <p:cond delay="0"/>
+                            </p:stCondLst>
+                            <p:childTnLst>
+                              <p:par>
+                                <p:cTn id="9" presetID="1" presetClass="entr" presetSubtype="0" fill="hold" grpId="0" nodeType="clickEffect">
+                                  <p:stCondLst>
+                                    <p:cond delay="0"/>
+                                  </p:stCondLst>
+                                  <p:childTnLst>
+                                    <p:set>
+                                      <p:cBhvr>
+                                        <p:cTn id="10" dur="1" fill="hold">
+                                          <p:stCondLst>
+                                            <p:cond delay="0"/>
+                                          </p:stCondLst>
+                                        </p:cTn>
+                                        <p:tgtEl>
+                                          <p:spTgt spid="3">
+                                            <p:txEl>
+                                              <p:pRg st="1" end="1"/>
+                                            </p:txEl>
+                                          </p:spTgt>
+                                        </p:tgtEl>
+                                        <p:attrNameLst>
+                                          <p:attrName>style.visibility</p:attrName>
+                                        </p:attrNameLst>
+                                      </p:cBhvr>
+                                      <p:to>
+                                        <p:strVal val="visible"/>
+                                      </p:to>
+                                    </p:set>
+                                  </p:childTnLst>
+                                </p:cTn>
+                              </p:par>
+                            </p:childTnLst>
+                          </p:cTn>
+                        </p:par>
+                      </p:childTnLst>
+                    </p:cTn>
+                  </p:par>
+                  <p:par>
+                    <p:cTn id="11" fill="hold">
+                      <p:stCondLst>
+                        <p:cond delay="indefinite"/>
+                      </p:stCondLst>
+                      <p:childTnLst>
+                        <p:par>
+                          <p:cTn id="12" fill="hold">
+                            <p:stCondLst>
+                              <p:cond delay="0"/>
+                            </p:stCondLst>
+                            <p:childTnLst>
+                              <p:par>
+                                <p:cTn id="13" presetID="1" presetClass="entr" presetSubtype="0" fill="hold" grpId="0" nodeType="clickEffect">
+                                  <p:stCondLst>
+                                    <p:cond delay="0"/>
+                                  </p:stCondLst>
+                                  <p:childTnLst>
+                                    <p:set>
+                                      <p:cBhvr>
+                                        <p:cTn id="14" dur="1" fill="hold">
+                                          <p:stCondLst>
+                                            <p:cond delay="0"/>
+                                          </p:stCondLst>
+                                        </p:cTn>
+                                        <p:tgtEl>
+                                          <p:spTgt spid="3">
+                                            <p:txEl>
+                                              <p:pRg st="2" end="2"/>
+                                            </p:txEl>
+                                          </p:spTgt>
+                                        </p:tgtEl>
+                                        <p:attrNameLst>
+                                          <p:attrName>style.visibility</p:attrName>
+                                        </p:attrNameLst>
+                                      </p:cBhvr>
+                                      <p:to>
+                                        <p:strVal val="visible"/>
+                                      </p:to>
+                                    </p:set>
+                                  </p:childTnLst>
+                                </p:cTn>
+                              </p:par>
+                            </p:childTnLst>
+                          </p:cTn>
+                        </p:par>
+                      </p:childTnLst>
+                    </p:cTn>
+                  </p:par>
+                  <p:par>
+                    <p:cTn id="15" fill="hold">
+                      <p:stCondLst>
+                        <p:cond delay="indefinite"/>
+                      </p:stCondLst>
+                      <p:childTnLst>
+                        <p:par>
+                          <p:cTn id="16" fill="hold">
+                            <p:stCondLst>
+                              <p:cond delay="0"/>
+                            </p:stCondLst>
+                            <p:childTnLst>
+                              <p:par>
+                                <p:cTn id="17" presetID="1" presetClass="entr" presetSubtype="0" fill="hold" grpId="0" nodeType="clickEffect">
+                                  <p:stCondLst>
+                                    <p:cond delay="0"/>
+                                  </p:stCondLst>
+                                  <p:childTnLst>
+                                    <p:set>
+                                      <p:cBhvr>
+                                        <p:cTn id="18" dur="1" fill="hold">
+                                          <p:stCondLst>
+                                            <p:cond delay="0"/>
+                                          </p:stCondLst>
+                                        </p:cTn>
+                                        <p:tgtEl>
+                                          <p:spTgt spid="3">
+                                            <p:txEl>
+                                              <p:pRg st="3" end="3"/>
+                                            </p:txEl>
+                                          </p:spTgt>
+                                        </p:tgtEl>
+                                        <p:attrNameLst>
+                                          <p:attrName>style.visibility</p:attrName>
+                                        </p:attrNameLst>
+                                      </p:cBhvr>
+                                      <p:to>
+                                        <p:strVal val="visible"/>
+                                      </p:to>
+                                    </p:set>
+                                  </p:childTnLst>
+                                </p:cTn>
+                              </p:par>
+                            </p:childTnLst>
+                          </p:cTn>
+                        </p:par>
+                      </p:childTnLst>
+                    </p:cTn>
+                  </p:par>
+                  <p:par>
+                    <p:cTn id="19" fill="hold">
+                      <p:stCondLst>
+                        <p:cond delay="indefinite"/>
+                      </p:stCondLst>
+                      <p:childTnLst>
+                        <p:par>
+                          <p:cTn id="20" fill="hold">
+                            <p:stCondLst>
+                              <p:cond delay="0"/>
+                            </p:stCondLst>
+                            <p:childTnLst>
+                              <p:par>
+                                <p:cTn id="21" presetID="1" presetClass="entr" presetSubtype="0" fill="hold" grpId="0" nodeType="clickEffect">
+                                  <p:stCondLst>
+                                    <p:cond delay="0"/>
+                                  </p:stCondLst>
+                                  <p:childTnLst>
+                                    <p:set>
+                                      <p:cBhvr>
+                                        <p:cTn id="22" dur="1" fill="hold">
+                                          <p:stCondLst>
+                                            <p:cond delay="0"/>
+                                          </p:stCondLst>
+                                        </p:cTn>
+                                        <p:tgtEl>
+                                          <p:spTgt spid="3">
+                                            <p:txEl>
+                                              <p:pRg st="4" end="4"/>
+                                            </p:txEl>
+                                          </p:spTgt>
+                                        </p:tgtEl>
+                                        <p:attrNameLst>
+                                          <p:attrName>style.visibility</p:attrName>
+                                        </p:attrNameLst>
+                                      </p:cBhvr>
+                                      <p:to>
+                                        <p:strVal val="visible"/>
+                                      </p:to>
+                                    </p:set>
+                                  </p:childTnLst>
+                                </p:cTn>
+                              </p:par>
+                            </p:childTnLst>
+                          </p:cTn>
+                        </p:par>
+                      </p:childTnLst>
+                    </p:cTn>
+                  </p:par>
+                </p:childTnLst>
+              </p:cTn>
+              <p:prevCondLst>
+                <p:cond evt="onPrev" delay="0">
+                  <p:tgtEl>
+                    <p:sldTgt/>
+                  </p:tgtEl>
+                </p:cond>
+              </p:prevCondLst>
+              <p:nextCondLst>
+                <p:cond evt="onNext" delay="0">
+                  <p:tgtEl>
+                    <p:sldTgt/>
+                  </p:tgtEl>
+                </p:cond>
+              </p:nextCondLst>
+            </p:seq>
+          </p:childTnLst>
+        </p:cTn>
+      </p:par>
+    </p:tnLst>
+    <p:bldLst>
+      <p:bldP spid="3" grpId="0" build="p"/>
+    </p:bldLst>
+  </p:timing>
 </p:sld>
 </file>
 

</xml_diff>